<commit_message>
Live Lecture 26 update - C00/D00
</commit_message>
<xml_diff>
--- a/lectures/lecture-26/Lecture-Live C00/Lecture 26 - Lecture.pptx
+++ b/lectures/lecture-26/Lecture-Live C00/Lecture 26 - Lecture.pptx
@@ -139,6 +139,682 @@
     </p:ext>
   </p:extLst>
 </p:presentation>
+</file>
+
+<file path=ppt/ink/ink1.xml><?xml version="1.0" encoding="utf-8"?>
+<inkml:ink xmlns:inkml="http://www.w3.org/2003/InkML">
+  <inkml:definitions>
+    <inkml:context xml:id="ctx0">
+      <inkml:inkSource xml:id="inkSrc0">
+        <inkml:traceFormat>
+          <inkml:channel name="X" type="integer" min="-2.14748E9" max="2.14748E9" units="cm"/>
+          <inkml:channel name="Y" type="integer" min="-2.14748E9" max="2.14748E9" units="cm"/>
+          <inkml:channel name="F" type="integer" max="32767" units="dev"/>
+          <inkml:channel name="OA" type="integer" max="360" units="deg"/>
+          <inkml:channel name="OE" type="integer" max="90" units="deg"/>
+        </inkml:traceFormat>
+        <inkml:channelProperties>
+          <inkml:channelProperty channel="X" name="resolution" value="1000" units="1/cm"/>
+          <inkml:channelProperty channel="Y" name="resolution" value="1000" units="1/cm"/>
+          <inkml:channelProperty channel="F" name="resolution" value="0" units="1/dev"/>
+          <inkml:channelProperty channel="OA" name="resolution" value="1000" units="1/deg"/>
+          <inkml:channelProperty channel="OE" name="resolution" value="1000" units="1/deg"/>
+        </inkml:channelProperties>
+      </inkml:inkSource>
+      <inkml:timestamp xml:id="ts0" timeString="2021-03-12T19:00:42.155"/>
+    </inkml:context>
+    <inkml:brush xml:id="br0">
+      <inkml:brushProperty name="width" value="0.05" units="cm"/>
+      <inkml:brushProperty name="height" value="0.05" units="cm"/>
+      <inkml:brushProperty name="color" value="#004F8B"/>
+    </inkml:brush>
+  </inkml:definitions>
+  <inkml:trace contextRef="#ctx0" brushRef="#br0">40 12 3224 0 0,'-2'1'919'0'0,"-5"3"1928"0"0,2-2-1512 0 0,4-1-1316 0 0,-23 12 6498 0 0,34-8-5385 0 0,-3-2-791 0 0,0 0 0 0 0,0 0 1 0 0,0-1-1 0 0,0 0 0 0 0,0 0 1 0 0,11 1-1 0 0,44 0 700 0 0,-19-2-1037 0 0,159 2 2635 0 0,-5-1-1476 0 0,-14-2 41 0 0,-73-3-654 0 0,14 5-36 0 0,114-3 180 0 0,40-24 401 0 0,-174 10-670 0 0,-59 7-308 0 0,1 2-1 0 0,0 2 1 0 0,73 4 0 0 0,9 3 38 0 0,64-3 427 0 0,-76-1-34 0 0,216 10 335 0 0,-255 1-515 0 0,-21-2-163 0 0,-18-9-194 0 0,-36 1-3 0 0,-1-1-1 0 0,0 0 1 0 0,1 0 0 0 0,-1 1 0 0 0,0-1 0 0 0,0 0 0 0 0,0 0 0 0 0,1 0 0 0 0,-1 0-1 0 0,0 0 1 0 0,0-1 0 0 0,0 1 0 0 0,-1 0 0 0 0,1 0 0 0 0,0-1 0 0 0,0 1 0 0 0,-1 0-1 0 0,1-1 1 0 0,-1 1 0 0 0,1-3 0 0 0,-1 3 44 0 0,2-6 116 0 0</inkml:trace>
+</inkml:ink>
+</file>
+
+<file path=ppt/ink/ink10.xml><?xml version="1.0" encoding="utf-8"?>
+<inkml:ink xmlns:inkml="http://www.w3.org/2003/InkML">
+  <inkml:definitions>
+    <inkml:context xml:id="ctx0">
+      <inkml:inkSource xml:id="inkSrc0">
+        <inkml:traceFormat>
+          <inkml:channel name="X" type="integer" min="-2.14748E9" max="2.14748E9" units="cm"/>
+          <inkml:channel name="Y" type="integer" min="-2.14748E9" max="2.14748E9" units="cm"/>
+          <inkml:channel name="F" type="integer" max="32767" units="dev"/>
+          <inkml:channel name="OA" type="integer" max="360" units="deg"/>
+          <inkml:channel name="OE" type="integer" max="90" units="deg"/>
+        </inkml:traceFormat>
+        <inkml:channelProperties>
+          <inkml:channelProperty channel="X" name="resolution" value="1000" units="1/cm"/>
+          <inkml:channelProperty channel="Y" name="resolution" value="1000" units="1/cm"/>
+          <inkml:channelProperty channel="F" name="resolution" value="0" units="1/dev"/>
+          <inkml:channelProperty channel="OA" name="resolution" value="1000" units="1/deg"/>
+          <inkml:channelProperty channel="OE" name="resolution" value="1000" units="1/deg"/>
+        </inkml:channelProperties>
+      </inkml:inkSource>
+      <inkml:timestamp xml:id="ts0" timeString="2021-03-12T19:01:00.835"/>
+    </inkml:context>
+    <inkml:brush xml:id="br0">
+      <inkml:brushProperty name="width" value="0.05" units="cm"/>
+      <inkml:brushProperty name="height" value="0.05" units="cm"/>
+      <inkml:brushProperty name="color" value="#004F8B"/>
+    </inkml:brush>
+  </inkml:definitions>
+  <inkml:trace contextRef="#ctx0" brushRef="#br0">9 73 15520 0 0,'9'-72'4823'0'0,"-9"74"-4311"0"0,5 27-371 0 0,-1 1 0 0 0,-2-1 0 0 0,-2 40 0 0 0,0-48-89 0 0,-5 242 104 0 0,4-251-160 0 0,-9 200 77 0 0,-2 89 750 0 0,12-269-630 0 0,-1 4 467 0 0,7 53-1 0 0,-6-88-623 0 0,0-1-1 0 0,0 1 1 0 0,0 0-1 0 0,0-1 0 0 0,0 1 1 0 0,0 0-1 0 0,1 0 1 0 0,-1-1-1 0 0,0 1 1 0 0,0 0-1 0 0,1-1 1 0 0,-1 1-1 0 0,0-1 0 0 0,1 1 1 0 0,-1 0-1 0 0,1-1 1 0 0,-1 1-1 0 0,1-1 1 0 0,-1 1-1 0 0,1-1 0 0 0,-1 1 1 0 0,1-1-1 0 0,-1 0 1 0 0,1 1-1 0 0,0-1 1 0 0,-1 0-1 0 0,1 1 1 0 0,0-1-1 0 0,-1 0 0 0 0,1 0 1 0 0,0 1-1 0 0,-1-1 1 0 0,1 0-1 0 0,0 0 1 0 0,-1 0-1 0 0,1 0 0 0 0,0 0 1 0 0,0 0-1 0 0,-1 0 1 0 0,1 0-1 0 0,0 0 1 0 0,-1-1-1 0 0,1 1 1 0 0,0 0-1 0 0,0-1 0 0 0,6-1 112 0 0,-1-1-1 0 0,0 0 0 0 0,0 0 1 0 0,6-5-1 0 0,4-2-4 0 0,74-26 53 0 0,-74 31-197 0 0,1 0-1 0 0,0 1 0 0 0,27-3 0 0 0,-31 6 50 0 0,-1 1 0 0 0,1 0 0 0 0,-1 1 0 0 0,1 1-1 0 0,-1-1 1 0 0,14 5 0 0 0,-19-3-212 0 0,-5-3 578 0 0,-22-10-149 0 0,13 7-220 0 0,5 2-34 0 0,0 0-1 0 0,0 0 1 0 0,0-1-1 0 0,0 1 1 0 0,0 0-1 0 0,0-1 1 0 0,0 1-1 0 0,1-1 1 0 0,-1 1-1 0 0,0-1 1 0 0,1 0-1 0 0,0 0 1 0 0,-3-3-1 0 0,4 4-11 0 0,0 1 0 0 0,0-1-1 0 0,-1 1 1 0 0,1-1-1 0 0,0 0 1 0 0,0 1 0 0 0,0-1-1 0 0,0 1 1 0 0,0-1-1 0 0,0 1 1 0 0,0-1-1 0 0,1 1 1 0 0,-1-1 0 0 0,0 1-1 0 0,0-1 1 0 0,0 1-1 0 0,0-1 1 0 0,1 1 0 0 0,-1-1-1 0 0,0 1 1 0 0,1-1-1 0 0,-1 1 1 0 0,0-1-1 0 0,1 1 1 0 0,-1 0 0 0 0,0-1-1 0 0,1 1 1 0 0,-1 0-1 0 0,1-1 1 0 0,-1 1 1 0 0,2-1 5 0 0,1 0-1 0 0,-1 1 0 0 0,0-1 1 0 0,0 1-1 0 0,1 0 0 0 0,-1-1 1 0 0,0 1-1 0 0,1 0 1 0 0,-1 1-1 0 0,0-1 0 0 0,0 0 1 0 0,1 1-1 0 0,-1-1 0 0 0,0 1 1 0 0,0-1-1 0 0,0 1 1 0 0,1 0-1 0 0,-1 0 0 0 0,0 0 1 0 0,0 0-1 0 0,0 1 0 0 0,-1-1 1 0 0,1 0-1 0 0,0 1 1 0 0,0-1-1 0 0,-1 1 0 0 0,1 0 1 0 0,-1 0-1 0 0,1-1 0 0 0,-1 1 1 0 0,2 3-1 0 0,-1-1 4 0 0,-1-1 0 0 0,1 0 0 0 0,-1 1 0 0 0,0-1 0 0 0,0 0 0 0 0,0 1 0 0 0,0 0 0 0 0,0-1 0 0 0,-1 1 0 0 0,0 0 0 0 0,0-1 0 0 0,0 1-1 0 0,0-1 1 0 0,0 1 0 0 0,-1 0 0 0 0,1-1 0 0 0,-1 1 0 0 0,-3 6 0 0 0,-11 19-2 0 0,-2-2-1 0 0,-1 1 1 0 0,-1-2-1 0 0,-22 24 1 0 0,-8 1-3224 0 0,43-44 1049 0 0</inkml:trace>
+</inkml:ink>
+</file>
+
+<file path=ppt/ink/ink11.xml><?xml version="1.0" encoding="utf-8"?>
+<inkml:ink xmlns:inkml="http://www.w3.org/2003/InkML">
+  <inkml:definitions>
+    <inkml:context xml:id="ctx0">
+      <inkml:inkSource xml:id="inkSrc0">
+        <inkml:traceFormat>
+          <inkml:channel name="X" type="integer" min="-2.14748E9" max="2.14748E9" units="cm"/>
+          <inkml:channel name="Y" type="integer" min="-2.14748E9" max="2.14748E9" units="cm"/>
+          <inkml:channel name="F" type="integer" max="32767" units="dev"/>
+          <inkml:channel name="OA" type="integer" max="360" units="deg"/>
+          <inkml:channel name="OE" type="integer" max="90" units="deg"/>
+        </inkml:traceFormat>
+        <inkml:channelProperties>
+          <inkml:channelProperty channel="X" name="resolution" value="1000" units="1/cm"/>
+          <inkml:channelProperty channel="Y" name="resolution" value="1000" units="1/cm"/>
+          <inkml:channelProperty channel="F" name="resolution" value="0" units="1/dev"/>
+          <inkml:channelProperty channel="OA" name="resolution" value="1000" units="1/deg"/>
+          <inkml:channelProperty channel="OE" name="resolution" value="1000" units="1/deg"/>
+        </inkml:channelProperties>
+      </inkml:inkSource>
+      <inkml:timestamp xml:id="ts0" timeString="2021-03-12T19:01:01.232"/>
+    </inkml:context>
+    <inkml:brush xml:id="br0">
+      <inkml:brushProperty name="width" value="0.05" units="cm"/>
+      <inkml:brushProperty name="height" value="0.05" units="cm"/>
+      <inkml:brushProperty name="color" value="#004F8B"/>
+    </inkml:brush>
+  </inkml:definitions>
+  <inkml:trace contextRef="#ctx0" brushRef="#br0">175 1 17335 0 0,'0'0'1572'0'0,"1"1"-1294"0"0,2 2-86 0 0,0 0 0 0 0,-1 0 1 0 0,1 0-1 0 0,-1 0 0 0 0,0 1 1 0 0,0-1-1 0 0,0 1 1 0 0,-1 0-1 0 0,1-1 0 0 0,-1 1 1 0 0,0 0-1 0 0,0 0 0 0 0,0 0 1 0 0,0 5-1 0 0,1 9 449 0 0,-2-1 0 0 0,-1 20 0 0 0,0-5 72 0 0,-1 78 694 0 0,4 120-41 0 0,-1-219-1604 0 0,1 0 0 0 0,0 0 0 0 0,0-1 0 0 0,8 21 0 0 0,-9-30-704 0 0,-13-2-5084 0 0,4-5 3872 0 0</inkml:trace>
+  <inkml:trace contextRef="#ctx0" brushRef="#br0" timeOffset="1">21 434 7368 0 0,'-1'0'575'0'0,"-16"-2"-1223"0"0,15-12 11565 0 0,3 13-10372 0 0,9-4 4799 0 0,14 3-4308 0 0,-17 1-432 0 0,7 0-220 0 0,0 1 1 0 0,0 0 0 0 0,26 5 0 0 0,-4 0-2121 0 0,-4 1-4617 0 0,-8-4-1894 0 0</inkml:trace>
+</inkml:ink>
+</file>
+
+<file path=ppt/ink/ink12.xml><?xml version="1.0" encoding="utf-8"?>
+<inkml:ink xmlns:inkml="http://www.w3.org/2003/InkML">
+  <inkml:definitions>
+    <inkml:context xml:id="ctx0">
+      <inkml:inkSource xml:id="inkSrc0">
+        <inkml:traceFormat>
+          <inkml:channel name="X" type="integer" min="-2.14748E9" max="2.14748E9" units="cm"/>
+          <inkml:channel name="Y" type="integer" min="-2.14748E9" max="2.14748E9" units="cm"/>
+          <inkml:channel name="F" type="integer" max="32767" units="dev"/>
+          <inkml:channel name="OA" type="integer" max="360" units="deg"/>
+          <inkml:channel name="OE" type="integer" max="90" units="deg"/>
+        </inkml:traceFormat>
+        <inkml:channelProperties>
+          <inkml:channelProperty channel="X" name="resolution" value="1000" units="1/cm"/>
+          <inkml:channelProperty channel="Y" name="resolution" value="1000" units="1/cm"/>
+          <inkml:channelProperty channel="F" name="resolution" value="0" units="1/dev"/>
+          <inkml:channelProperty channel="OA" name="resolution" value="1000" units="1/deg"/>
+          <inkml:channelProperty channel="OE" name="resolution" value="1000" units="1/deg"/>
+        </inkml:channelProperties>
+      </inkml:inkSource>
+      <inkml:timestamp xml:id="ts0" timeString="2021-03-12T19:01:02.090"/>
+    </inkml:context>
+    <inkml:brush xml:id="br0">
+      <inkml:brushProperty name="width" value="0.05" units="cm"/>
+      <inkml:brushProperty name="height" value="0.05" units="cm"/>
+      <inkml:brushProperty name="color" value="#004F8B"/>
+    </inkml:brush>
+  </inkml:definitions>
+  <inkml:trace contextRef="#ctx0" brushRef="#br0">5 130 3680 0 0,'-5'-3'21555'0'0,"12"-1"-21411"0"0,0-1 1 0 0,1 1-1 0 0,-1 0 0 0 0,1 1 0 0 0,15-5 0 0 0,11-6 117 0 0,-16 6-188 0 0,91-41 757 0 0,-95 44-1071 0 0,1 1 0 0 0,-1 0 0 0 0,1 1 0 0 0,-1 0 0 0 0,30 0 0 0 0,-29 2-1769 0 0,-3-1-3764 0 0,-2-1-1996 0 0</inkml:trace>
+</inkml:ink>
+</file>
+
+<file path=ppt/ink/ink13.xml><?xml version="1.0" encoding="utf-8"?>
+<inkml:ink xmlns:inkml="http://www.w3.org/2003/InkML">
+  <inkml:definitions>
+    <inkml:context xml:id="ctx0">
+      <inkml:inkSource xml:id="inkSrc0">
+        <inkml:traceFormat>
+          <inkml:channel name="X" type="integer" min="-2.14748E9" max="2.14748E9" units="cm"/>
+          <inkml:channel name="Y" type="integer" min="-2.14748E9" max="2.14748E9" units="cm"/>
+          <inkml:channel name="F" type="integer" max="32767" units="dev"/>
+          <inkml:channel name="OA" type="integer" max="360" units="deg"/>
+          <inkml:channel name="OE" type="integer" max="90" units="deg"/>
+        </inkml:traceFormat>
+        <inkml:channelProperties>
+          <inkml:channelProperty channel="X" name="resolution" value="1000" units="1/cm"/>
+          <inkml:channelProperty channel="Y" name="resolution" value="1000" units="1/cm"/>
+          <inkml:channelProperty channel="F" name="resolution" value="0" units="1/dev"/>
+          <inkml:channelProperty channel="OA" name="resolution" value="1000" units="1/deg"/>
+          <inkml:channelProperty channel="OE" name="resolution" value="1000" units="1/deg"/>
+        </inkml:channelProperties>
+      </inkml:inkSource>
+      <inkml:timestamp xml:id="ts0" timeString="2021-03-12T19:01:02.580"/>
+    </inkml:context>
+    <inkml:brush xml:id="br0">
+      <inkml:brushProperty name="width" value="0.05" units="cm"/>
+      <inkml:brushProperty name="height" value="0.05" units="cm"/>
+      <inkml:brushProperty name="color" value="#004F8B"/>
+    </inkml:brush>
+  </inkml:definitions>
+  <inkml:trace contextRef="#ctx0" brushRef="#br0">5 60 3224 0 0,'-4'-19'13813'0'0,"6"16"-12382"0"0,1 0 0 0 0,0 0 0 0 0,-1 0 0 0 0,7-5 0 0 0,-5 6-1287 0 0,-1-1 0 0 0,1 1 0 0 0,-1 0 0 0 0,1 0 0 0 0,-1 0 0 0 0,1 1 1 0 0,0 0-1 0 0,0-1 0 0 0,0 1 0 0 0,0 0 0 0 0,0 1 0 0 0,0-1 0 0 0,0 1 1 0 0,0 0-1 0 0,4 0 0 0 0,-6 0-112 0 0,-1 1 1 0 0,1-1-1 0 0,-1 1 1 0 0,0-1-1 0 0,1 1 1 0 0,-1 0-1 0 0,0-1 1 0 0,0 1-1 0 0,1 0 1 0 0,-1 0-1 0 0,0 0 1 0 0,0 0-1 0 0,0 0 1 0 0,0 0-1 0 0,0 0 1 0 0,0 0-1 0 0,-1 0 1 0 0,1 1-1 0 0,0-1 1 0 0,-1 0-1 0 0,1 1 1 0 0,0-1-1 0 0,-1 0 1 0 0,1 3-1 0 0,1 3-105 0 0,0 0-1 0 0,-1 1 0 0 0,1 8 0 0 0,-2-15 85 0 0,0 10 40 0 0,0 1 0 0 0,0 0 0 0 0,-1 0 0 0 0,-1-1 0 0 0,0 1 0 0 0,-4 12 0 0 0,-2 0 50 0 0,-18 41-1 0 0,20-52-94 0 0,5-12-102 0 0,20-7-127 0 0,4-3 405 0 0,0 1 0 0 0,1 1 0 0 0,0 1 1 0 0,1 1-1 0 0,-1 1 0 0 0,43-1 0 0 0,-62 5-43 0 0,0 0 0 0 0,0 0 0 0 0,0 1 1 0 0,0 0-1 0 0,0-1 0 0 0,6 3 0 0 0,-10-2-139 0 0,0-1 0 0 0,0 1 0 0 0,1-1 0 0 0,-1 1 0 0 0,0 0-1 0 0,0-1 1 0 0,0 1 0 0 0,0 0 0 0 0,0 0 0 0 0,0 0 0 0 0,0 0 0 0 0,0 0 0 0 0,0 0-1 0 0,-1 0 1 0 0,1 0 0 0 0,0 0 0 0 0,-1 0 0 0 0,1 0 0 0 0,0 1 0 0 0,-1-1-1 0 0,0 0 1 0 0,1 0 0 0 0,-1 1 0 0 0,0-1 0 0 0,1 0 0 0 0,-1 1 0 0 0,0-1 0 0 0,0 2-1 0 0,-1 3 15 0 0,0 0 0 0 0,0 0 0 0 0,0 0 0 0 0,-1 0 0 0 0,1 0 0 0 0,-2 0-1 0 0,1 0 1 0 0,-1 0 0 0 0,0-1 0 0 0,-6 10 0 0 0,0-2 217 0 0,0-1 0 0 0,-1 0 1 0 0,-15 14-1 0 0,-7 5-476 0 0,-2-1 0 0 0,-1-2 0 0 0,-69 42 0 0 0,77-61-1221 0 0,20-7 916 0 0,5-2-337 0 0,11-6-2198 0 0,13-16-4845 0 0,-5 10 1130 0 0</inkml:trace>
+</inkml:ink>
+</file>
+
+<file path=ppt/ink/ink14.xml><?xml version="1.0" encoding="utf-8"?>
+<inkml:ink xmlns:inkml="http://www.w3.org/2003/InkML">
+  <inkml:definitions>
+    <inkml:context xml:id="ctx0">
+      <inkml:inkSource xml:id="inkSrc0">
+        <inkml:traceFormat>
+          <inkml:channel name="X" type="integer" min="-2.14748E9" max="2.14748E9" units="cm"/>
+          <inkml:channel name="Y" type="integer" min="-2.14748E9" max="2.14748E9" units="cm"/>
+          <inkml:channel name="F" type="integer" max="32767" units="dev"/>
+          <inkml:channel name="OA" type="integer" max="360" units="deg"/>
+          <inkml:channel name="OE" type="integer" max="90" units="deg"/>
+        </inkml:traceFormat>
+        <inkml:channelProperties>
+          <inkml:channelProperty channel="X" name="resolution" value="1000" units="1/cm"/>
+          <inkml:channelProperty channel="Y" name="resolution" value="1000" units="1/cm"/>
+          <inkml:channelProperty channel="F" name="resolution" value="0" units="1/dev"/>
+          <inkml:channelProperty channel="OA" name="resolution" value="1000" units="1/deg"/>
+          <inkml:channelProperty channel="OE" name="resolution" value="1000" units="1/deg"/>
+        </inkml:channelProperties>
+      </inkml:inkSource>
+      <inkml:timestamp xml:id="ts0" timeString="2021-03-12T19:01:02.967"/>
+    </inkml:context>
+    <inkml:brush xml:id="br0">
+      <inkml:brushProperty name="width" value="0.05" units="cm"/>
+      <inkml:brushProperty name="height" value="0.05" units="cm"/>
+      <inkml:brushProperty name="color" value="#004F8B"/>
+    </inkml:brush>
+  </inkml:definitions>
+  <inkml:trace contextRef="#ctx0" brushRef="#br0">94 112 4144 0 0,'16'-38'2041'0'0,"-1"-1"10695"0"0,-14 38-12602 0 0,-1 0 0 0 0,0 0-1 0 0,1 0 1 0 0,-1 0 0 0 0,0 0 0 0 0,0 0 0 0 0,0 0 0 0 0,0 0 0 0 0,0 0 0 0 0,0 0 0 0 0,0 0 0 0 0,0 0-1 0 0,0 0 1 0 0,0 0 0 0 0,0 0 0 0 0,-1 0 0 0 0,1 0 0 0 0,0 0 0 0 0,-1 0 0 0 0,1 0 0 0 0,-1 0 0 0 0,1 1-1 0 0,-1-1 1 0 0,0 0 0 0 0,1 0 0 0 0,-1 0 0 0 0,0 1 0 0 0,1-1 0 0 0,-1 0 0 0 0,0 1 0 0 0,0-1 0 0 0,0 1-1 0 0,0-1 1 0 0,1 1 0 0 0,-1-1 0 0 0,0 1 0 0 0,0-1 0 0 0,-1 1 0 0 0,0-1-23 0 0,0 1 1 0 0,0-1 0 0 0,0 1-1 0 0,0 0 1 0 0,0 0 0 0 0,0 0-1 0 0,1 0 1 0 0,-1 0 0 0 0,0 0-1 0 0,0 0 1 0 0,0 0-1 0 0,0 1 1 0 0,0-1 0 0 0,0 1-1 0 0,1 0 1 0 0,-1-1 0 0 0,0 1-1 0 0,0 0 1 0 0,1 0 0 0 0,-4 2-1 0 0,-2 5 12 0 0,0 0-1 0 0,0 0 0 0 0,1 1 1 0 0,0 0-1 0 0,1 0 1 0 0,0 0-1 0 0,0 1 0 0 0,1 0 1 0 0,-4 12-1 0 0,5-10 44 0 0,1-1 0 0 0,1 1-1 0 0,0 0 1 0 0,0 0 0 0 0,1-1-1 0 0,2 17 1 0 0,-1-24-52 0 0,0 0 0 0 0,0 0 1 0 0,0 0-1 0 0,0-1 0 0 0,1 1 0 0 0,2 5 0 0 0,-4-8-97 0 0,1-1 0 0 0,-1 1 1 0 0,0-1-1 0 0,0 1 0 0 0,1-1 0 0 0,-1 1 0 0 0,0-1 1 0 0,1 1-1 0 0,-1-1 0 0 0,1 1 0 0 0,-1-1 0 0 0,0 1 1 0 0,1-1-1 0 0,-1 1 0 0 0,1-1 0 0 0,-1 0 0 0 0,1 1 0 0 0,-1-1 1 0 0,1 0-1 0 0,0 0 0 0 0,-1 1 0 0 0,1-1 0 0 0,-1 0 1 0 0,1 0-1 0 0,0 0 0 0 0,-1 0 0 0 0,1 1 0 0 0,0-1 1 0 0,-1 0-1 0 0,1 0 0 0 0,-1 0 0 0 0,1-1 0 0 0,0 1 0 0 0,-1 0 1 0 0,1 0-1 0 0,-1 0 0 0 0,1 0 0 0 0,0-1 0 0 0,-1 1 1 0 0,1 0-1 0 0,-1 0 0 0 0,1-1 0 0 0,-1 1 0 0 0,1 0 0 0 0,-1-1 1 0 0,1 1-1 0 0,0-1 0 0 0,8-8 192 0 0,-4 4-122 0 0,0 0-1 0 0,0 0 1 0 0,-1 0 0 0 0,1 0 0 0 0,-1-1-1 0 0,-1 1 1 0 0,4-8 0 0 0,-2 2-38 0 0,-1 0-1 0 0,0 0 1 0 0,-1-1 0 0 0,0 0 0 0 0,-1 0 0 0 0,2-15 0 0 0,-6-17-2294 0 0,0 31 989 0 0</inkml:trace>
+</inkml:ink>
+</file>
+
+<file path=ppt/ink/ink15.xml><?xml version="1.0" encoding="utf-8"?>
+<inkml:ink xmlns:inkml="http://www.w3.org/2003/InkML">
+  <inkml:definitions>
+    <inkml:context xml:id="ctx0">
+      <inkml:inkSource xml:id="inkSrc0">
+        <inkml:traceFormat>
+          <inkml:channel name="X" type="integer" min="-2.14748E9" max="2.14748E9" units="cm"/>
+          <inkml:channel name="Y" type="integer" min="-2.14748E9" max="2.14748E9" units="cm"/>
+          <inkml:channel name="F" type="integer" max="32767" units="dev"/>
+          <inkml:channel name="OA" type="integer" max="360" units="deg"/>
+          <inkml:channel name="OE" type="integer" max="90" units="deg"/>
+        </inkml:traceFormat>
+        <inkml:channelProperties>
+          <inkml:channelProperty channel="X" name="resolution" value="1000" units="1/cm"/>
+          <inkml:channelProperty channel="Y" name="resolution" value="1000" units="1/cm"/>
+          <inkml:channelProperty channel="F" name="resolution" value="0" units="1/dev"/>
+          <inkml:channelProperty channel="OA" name="resolution" value="1000" units="1/deg"/>
+          <inkml:channelProperty channel="OE" name="resolution" value="1000" units="1/deg"/>
+        </inkml:channelProperties>
+      </inkml:inkSource>
+      <inkml:timestamp xml:id="ts0" timeString="2021-03-12T19:01:03.615"/>
+    </inkml:context>
+    <inkml:brush xml:id="br0">
+      <inkml:brushProperty name="width" value="0.05" units="cm"/>
+      <inkml:brushProperty name="height" value="0.05" units="cm"/>
+      <inkml:brushProperty name="color" value="#004F8B"/>
+    </inkml:brush>
+  </inkml:definitions>
+  <inkml:trace contextRef="#ctx0" brushRef="#br0">0 210 6912 0 0,'0'0'622'0'0,"3"-17"6585"0"0,14-18-2571 0 0,-6 13-3339 0 0,-7 14-724 0 0,1-1-1 0 0,9-12 0 0 0,0 3 149 0 0,-11 12-538 0 0,1 1 1 0 0,0 0-1 0 0,0 0 0 0 0,0 0 0 0 0,1 0 1 0 0,0 0-1 0 0,-1 1 0 0 0,2 0 0 0 0,-1 0 1 0 0,0 1-1 0 0,10-6 0 0 0,-14 9-189 0 0,0 0 0 0 0,-1 0 0 0 0,1 0 0 0 0,0 0 0 0 0,0 0 0 0 0,-1 0 0 0 0,1 0 0 0 0,0 0 0 0 0,0 1 0 0 0,0-1 0 0 0,-1 0 0 0 0,1 0 0 0 0,0 1 0 0 0,0-1 0 0 0,-1 0 0 0 0,1 1 0 0 0,0-1 0 0 0,-1 1 0 0 0,1-1 0 0 0,-1 1 0 0 0,1-1 0 0 0,0 1 0 0 0,-1-1 0 0 0,1 1 0 0 0,-1 0 0 0 0,1-1 0 0 0,-1 1 1 0 0,0 0-1 0 0,1-1 0 0 0,-1 1 0 0 0,0 0 0 0 0,1-1 0 0 0,-1 1 0 0 0,0 0 0 0 0,0 0 0 0 0,1 1 0 0 0,0 3-52 0 0,1 0 0 0 0,-1 0 0 0 0,1 11 0 0 0,1 20-53 0 0,3 51-215 0 0,-6-86 322 0 0,0 0 0 0 0,0 0 1 0 0,0 0-1 0 0,0 0 1 0 0,0 0-1 0 0,1 1 1 0 0,-1-1-1 0 0,0 0 1 0 0,1 0-1 0 0,-1 0 0 0 0,1 0 1 0 0,-1 0-1 0 0,1 0 1 0 0,0 1-1 0 0,0-2 4 0 0,-1 0 1 0 0,0 1-1 0 0,1-1 0 0 0,-1 1 0 0 0,0-1 1 0 0,1 0-1 0 0,-1 1 0 0 0,0-1 0 0 0,1 0 1 0 0,-1 1-1 0 0,1-1 0 0 0,-1 0 0 0 0,1 0 0 0 0,-1 0 1 0 0,0 1-1 0 0,1-1 0 0 0,-1 0 0 0 0,1 0 1 0 0,-1 0-1 0 0,1 0 0 0 0,-1 0 0 0 0,1 0 0 0 0,-1 0 1 0 0,1 0-1 0 0,-1 0 0 0 0,1 0 0 0 0,-1 0 1 0 0,1 0-1 0 0,-1 0 0 0 0,1 0 0 0 0,-1 0 0 0 0,1-1 1 0 0,-1 1-1 0 0,1 0 0 0 0,11-11-26 0 0,-10 10 12 0 0,109-129-17 0 0,-107 125 180 0 0,5-6 179 0 0,-5 5-54 0 0,0 0 0 0 0,1 1-1 0 0,0 0 1 0 0,0 0 0 0 0,0 0 0 0 0,1 0 0 0 0,-1 1-1 0 0,1-1 1 0 0,7-2 0 0 0,-12 7-276 0 0,-1 0-1 0 0,1 0 0 0 0,0 0 1 0 0,0 0-1 0 0,0 0 1 0 0,0 0-1 0 0,-1 1 1 0 0,1-1-1 0 0,0 0 1 0 0,0 1-1 0 0,0-1 1 0 0,-1 0-1 0 0,1 1 0 0 0,0-1 1 0 0,-1 1-1 0 0,1-1 1 0 0,0 1-1 0 0,-1-1 1 0 0,1 1-1 0 0,-1 0 1 0 0,1-1-1 0 0,-1 1 0 0 0,1 0 1 0 0,-1 0-1 0 0,1-1 1 0 0,-1 1-1 0 0,1 1 1 0 0,11 21-71 0 0,-12-23 73 0 0,2 6-75 0 0,-1 0 1 0 0,1 0-1 0 0,-1 0 0 0 0,0 8 0 0 0,0-9-31 0 0,-1-1 0 0 0,0 0 0 0 0,1 1 0 0 0,0-1-1 0 0,0 0 1 0 0,0 0 0 0 0,1 0 0 0 0,-1 0 0 0 0,1 0 0 0 0,4 7 0 0 0,-5-11-22 0 0,-1 1 0 0 0,1-1 1 0 0,-1 1-1 0 0,1-1 0 0 0,0 1 0 0 0,-1-1 1 0 0,1 0-1 0 0,0 1 0 0 0,-1-1 0 0 0,1 0 1 0 0,0 0-1 0 0,0 0 0 0 0,-1 1 0 0 0,1-1 1 0 0,0 0-1 0 0,0 0 0 0 0,-1 0 0 0 0,1 0 1 0 0,0 0-1 0 0,0 0 0 0 0,-1-1 0 0 0,1 1 1 0 0,0 0-1 0 0,0 0 0 0 0,-1 0 0 0 0,1-1 0 0 0,1 0 1 0 0,1 0-458 0 0,0 0 1 0 0,0-1-1 0 0,0 0 1 0 0,-1 0 0 0 0,6-3-1 0 0,5-7-1158 0 0</inkml:trace>
+</inkml:ink>
+</file>
+
+<file path=ppt/ink/ink16.xml><?xml version="1.0" encoding="utf-8"?>
+<inkml:ink xmlns:inkml="http://www.w3.org/2003/InkML">
+  <inkml:definitions>
+    <inkml:context xml:id="ctx0">
+      <inkml:inkSource xml:id="inkSrc0">
+        <inkml:traceFormat>
+          <inkml:channel name="X" type="integer" min="-2.14748E9" max="2.14748E9" units="cm"/>
+          <inkml:channel name="Y" type="integer" min="-2.14748E9" max="2.14748E9" units="cm"/>
+          <inkml:channel name="F" type="integer" max="32767" units="dev"/>
+          <inkml:channel name="OA" type="integer" max="360" units="deg"/>
+          <inkml:channel name="OE" type="integer" max="90" units="deg"/>
+        </inkml:traceFormat>
+        <inkml:channelProperties>
+          <inkml:channelProperty channel="X" name="resolution" value="1000" units="1/cm"/>
+          <inkml:channelProperty channel="Y" name="resolution" value="1000" units="1/cm"/>
+          <inkml:channelProperty channel="F" name="resolution" value="0" units="1/dev"/>
+          <inkml:channelProperty channel="OA" name="resolution" value="1000" units="1/deg"/>
+          <inkml:channelProperty channel="OE" name="resolution" value="1000" units="1/deg"/>
+        </inkml:channelProperties>
+      </inkml:inkSource>
+      <inkml:timestamp xml:id="ts0" timeString="2021-03-12T19:01:04"/>
+    </inkml:context>
+    <inkml:brush xml:id="br0">
+      <inkml:brushProperty name="width" value="0.05" units="cm"/>
+      <inkml:brushProperty name="height" value="0.05" units="cm"/>
+      <inkml:brushProperty name="color" value="#004F8B"/>
+    </inkml:brush>
+  </inkml:definitions>
+  <inkml:trace contextRef="#ctx0" brushRef="#br0">88 188 9672 0 0,'0'0'748'0'0,"-4"13"-188"0"0,-29 61 7653 0 0,26-59-7584 0 0,2-1 1 0 0,-7 28 0 0 0,1-3-347 0 0,7-26-335 0 0,2-8-127 0 0,0-1-1 0 0,0 0 1 0 0,1 1-1 0 0,0-1 1 0 0,0 1-1 0 0,0 0 1 0 0,0-1-1 0 0,1 1 1 0 0,0 0-1 0 0,0 0 0 0 0,0-1 1 0 0,1 8-1 0 0,2-4-6687 0 0</inkml:trace>
+  <inkml:trace contextRef="#ctx0" brushRef="#br0" timeOffset="1">239 5 12896 0 0,'-8'-4'3743'0'0,"5"8"-2903"0"0,0 6-1808 0 0,0 1-367 0 0</inkml:trace>
+</inkml:ink>
+</file>
+
+<file path=ppt/ink/ink17.xml><?xml version="1.0" encoding="utf-8"?>
+<inkml:ink xmlns:inkml="http://www.w3.org/2003/InkML">
+  <inkml:definitions>
+    <inkml:context xml:id="ctx0">
+      <inkml:inkSource xml:id="inkSrc0">
+        <inkml:traceFormat>
+          <inkml:channel name="X" type="integer" min="-2.14748E9" max="2.14748E9" units="cm"/>
+          <inkml:channel name="Y" type="integer" min="-2.14748E9" max="2.14748E9" units="cm"/>
+          <inkml:channel name="F" type="integer" max="32767" units="dev"/>
+          <inkml:channel name="OA" type="integer" max="360" units="deg"/>
+          <inkml:channel name="OE" type="integer" max="90" units="deg"/>
+        </inkml:traceFormat>
+        <inkml:channelProperties>
+          <inkml:channelProperty channel="X" name="resolution" value="1000" units="1/cm"/>
+          <inkml:channelProperty channel="Y" name="resolution" value="1000" units="1/cm"/>
+          <inkml:channelProperty channel="F" name="resolution" value="0" units="1/dev"/>
+          <inkml:channelProperty channel="OA" name="resolution" value="1000" units="1/deg"/>
+          <inkml:channelProperty channel="OE" name="resolution" value="1000" units="1/deg"/>
+        </inkml:channelProperties>
+      </inkml:inkSource>
+      <inkml:timestamp xml:id="ts0" timeString="2021-03-12T19:01:04.338"/>
+    </inkml:context>
+    <inkml:brush xml:id="br0">
+      <inkml:brushProperty name="width" value="0.05" units="cm"/>
+      <inkml:brushProperty name="height" value="0.05" units="cm"/>
+      <inkml:brushProperty name="color" value="#004F8B"/>
+    </inkml:brush>
+  </inkml:definitions>
+  <inkml:trace contextRef="#ctx0" brushRef="#br0">1 288 16040 0 0,'0'0'1451'0'0,"3"-6"-363"0"0,43-110 5095 0 0,-17 38-4271 0 0,0-2-483 0 0,-27 72-1343 0 0,-2 8 8 0 0,-2 15 14 0 0,-2 34-133 0 0,2-39 17 0 0,1 0 1 0 0,0 0-1 0 0,1 0 0 0 0,0 1 0 0 0,2 12 0 0 0,-1-18 8 0 0,0 2 0 0 0,0 0 0 0 0,1 1 0 0 0,0-2 0 0 0,3 9 0 0 0,-4-13 0 0 0,0-1 0 0 0,-1 1 0 0 0,1 0 0 0 0,0-1 0 0 0,0 0 0 0 0,0 1 0 0 0,0-1 0 0 0,1 0 0 0 0,-1 1 0 0 0,0-1 0 0 0,1 0 0 0 0,-1 0 0 0 0,0 0 0 0 0,1 0 0 0 0,-1 0 0 0 0,1 0 0 0 0,0-1 0 0 0,-1 1 0 0 0,1-1 0 0 0,0 1 0 0 0,-1-1 0 0 0,4 1 0 0 0,-2-1 0 0 0,0 0 1 0 0,1 0-1 0 0,-1-1 0 0 0,0 1 1 0 0,1-1-1 0 0,-1 0 0 0 0,0 0 0 0 0,0 0 1 0 0,0 0-1 0 0,0-1 0 0 0,0 1 1 0 0,0-1-1 0 0,0 0 0 0 0,0 0 1 0 0,0 0-1 0 0,-1 0 0 0 0,4-4 0 0 0,6-6 13 0 0,0-1 0 0 0,11-17-1 0 0,-12 17-10 0 0,-7 8-262 0 0,6-8-1871 0 0,23-23 0 0 0,-22 28-408 0 0</inkml:trace>
+</inkml:ink>
+</file>
+
+<file path=ppt/ink/ink18.xml><?xml version="1.0" encoding="utf-8"?>
+<inkml:ink xmlns:inkml="http://www.w3.org/2003/InkML">
+  <inkml:definitions>
+    <inkml:context xml:id="ctx0">
+      <inkml:inkSource xml:id="inkSrc0">
+        <inkml:traceFormat>
+          <inkml:channel name="X" type="integer" min="-2.14748E9" max="2.14748E9" units="cm"/>
+          <inkml:channel name="Y" type="integer" min="-2.14748E9" max="2.14748E9" units="cm"/>
+          <inkml:channel name="F" type="integer" max="32767" units="dev"/>
+          <inkml:channel name="OA" type="integer" max="360" units="deg"/>
+          <inkml:channel name="OE" type="integer" max="90" units="deg"/>
+        </inkml:traceFormat>
+        <inkml:channelProperties>
+          <inkml:channelProperty channel="X" name="resolution" value="1000" units="1/cm"/>
+          <inkml:channelProperty channel="Y" name="resolution" value="1000" units="1/cm"/>
+          <inkml:channelProperty channel="F" name="resolution" value="0" units="1/dev"/>
+          <inkml:channelProperty channel="OA" name="resolution" value="1000" units="1/deg"/>
+          <inkml:channelProperty channel="OE" name="resolution" value="1000" units="1/deg"/>
+        </inkml:channelProperties>
+      </inkml:inkSource>
+      <inkml:timestamp xml:id="ts0" timeString="2021-03-12T19:01:04.735"/>
+    </inkml:context>
+    <inkml:brush xml:id="br0">
+      <inkml:brushProperty name="width" value="0.05" units="cm"/>
+      <inkml:brushProperty name="height" value="0.05" units="cm"/>
+      <inkml:brushProperty name="color" value="#004F8B"/>
+    </inkml:brush>
+  </inkml:definitions>
+  <inkml:trace contextRef="#ctx0" brushRef="#br0">54 18 12896 0 0,'0'0'997'0'0,"-9"-7"6551"0"0,6 9-7427 0 0,0 0 0 0 0,1 0-1 0 0,-1 0 1 0 0,1 0 0 0 0,0 1 0 0 0,-1-1 0 0 0,1 0 0 0 0,0 1 0 0 0,1 0 0 0 0,-1-1 0 0 0,0 1 0 0 0,1 0 0 0 0,-1 0-1 0 0,-1 6 1 0 0,0 2-97 0 0,1 0 0 0 0,0 0 0 0 0,0 12 0 0 0,0-10 17 0 0,2-9-29 0 0,0 0-1 0 0,0 0 0 0 0,0 0 1 0 0,0 0-1 0 0,1-1 0 0 0,-1 1 1 0 0,1 0-1 0 0,0 0 0 0 0,0-1 0 0 0,1 1 1 0 0,-1 0-1 0 0,3 3 0 0 0,-4-6 18 0 0,1 0 1 0 0,0 1-1 0 0,0-1 0 0 0,0 0 0 0 0,0 0 0 0 0,0 0 0 0 0,0 0 0 0 0,0 0 0 0 0,0 0 0 0 0,0-1 0 0 0,0 1 0 0 0,1 0 0 0 0,-1 0 0 0 0,0-1 0 0 0,1 1 0 0 0,-1-1 0 0 0,0 1 0 0 0,1-1 0 0 0,-1 0 0 0 0,0 1 1 0 0,1-1-1 0 0,-1 0 0 0 0,1 0 0 0 0,-1 0 0 0 0,1 0 0 0 0,-1 0 0 0 0,0 0 0 0 0,1-1 0 0 0,-1 1 0 0 0,1 0 0 0 0,-1-1 0 0 0,0 1 0 0 0,1-1 0 0 0,1-1 0 0 0,1 0 64 0 0,0 0-1 0 0,0 0 0 0 0,0-1 1 0 0,-1 0-1 0 0,1 0 0 0 0,-1 0 1 0 0,1 0-1 0 0,3-6 0 0 0,22-32 385 0 0,-10 13-237 0 0,1 2 626 0 0,35-33 0 0 0,-55 59-867 0 0,1-1-1 0 0,-1 1 1 0 0,0 0-1 0 0,0-1 1 0 0,1 1-1 0 0,-1 0 0 0 0,0 0 1 0 0,1 0-1 0 0,-1-1 1 0 0,0 1-1 0 0,1 0 1 0 0,-1 0-1 0 0,0 0 1 0 0,1 0-1 0 0,-1 0 1 0 0,0 0-1 0 0,1-1 1 0 0,-1 1-1 0 0,1 0 1 0 0,-1 0-1 0 0,0 0 1 0 0,1 0-1 0 0,-1 0 1 0 0,1 1-1 0 0,-1-1 1 0 0,0 0-1 0 0,1 0 0 0 0,-1 0 1 0 0,0 0-1 0 0,1 0 1 0 0,-1 0-1 0 0,0 1 1 0 0,1-1-1 0 0,-1 0 1 0 0,0 0-1 0 0,1 0 1 0 0,-1 1-1 0 0,0-1 1 0 0,1 0-1 0 0,-1 0 1 0 0,0 1-1 0 0,0-1 1 0 0,0 0-1 0 0,1 1 1 0 0,-1-1-1 0 0,0 0 1 0 0,0 1-1 0 0,0-1 1 0 0,0 0-1 0 0,1 1 0 0 0,7 23 221 0 0,-6-18-68 0 0,-1 0-102 0 0,0-1 0 0 0,0 1 0 0 0,0 12 0 0 0,3 13-213 0 0,-4-28-271 0 0,8 20-429 0 0,-8-22 755 0 0,0-1 1 0 0,0 0-1 0 0,0 1 1 0 0,1-1 0 0 0,-1 1-1 0 0,0-1 1 0 0,0 0-1 0 0,0 1 1 0 0,0-1-1 0 0,1 0 1 0 0,-1 1-1 0 0,0-1 1 0 0,0 0-1 0 0,1 1 1 0 0,-1-1 0 0 0,0 0-1 0 0,0 1 1 0 0,1-1-1 0 0,-1 0 1 0 0,0 0-1 0 0,1 0 1 0 0,-1 1-1 0 0,1-1 1 0 0,-1 0-1 0 0,0 0 1 0 0,1 0 0 0 0,-1 0-1 0 0,0 0 1 0 0,1 1-1 0 0,-1-1 1 0 0,1 0-1 0 0,-1 0 1 0 0,0 0-1 0 0,1 0 1 0 0,-1 0-1 0 0,1 0 1 0 0,-1 0 0 0 0,1-1-1 0 0,-1 1 1 0 0,0 0-1 0 0,1 0 1 0 0,-1 0-1 0 0,0 0 1 0 0,1 0-1 0 0,-1-1 1 0 0,0 1-1 0 0,1 0 1 0 0,5-4-2115 0 0</inkml:trace>
+</inkml:ink>
+</file>
+
+<file path=ppt/ink/ink19.xml><?xml version="1.0" encoding="utf-8"?>
+<inkml:ink xmlns:inkml="http://www.w3.org/2003/InkML">
+  <inkml:definitions>
+    <inkml:context xml:id="ctx0">
+      <inkml:inkSource xml:id="inkSrc0">
+        <inkml:traceFormat>
+          <inkml:channel name="X" type="integer" min="-2.14748E9" max="2.14748E9" units="cm"/>
+          <inkml:channel name="Y" type="integer" min="-2.14748E9" max="2.14748E9" units="cm"/>
+          <inkml:channel name="F" type="integer" max="32767" units="dev"/>
+          <inkml:channel name="OA" type="integer" max="360" units="deg"/>
+          <inkml:channel name="OE" type="integer" max="90" units="deg"/>
+        </inkml:traceFormat>
+        <inkml:channelProperties>
+          <inkml:channelProperty channel="X" name="resolution" value="1000" units="1/cm"/>
+          <inkml:channelProperty channel="Y" name="resolution" value="1000" units="1/cm"/>
+          <inkml:channelProperty channel="F" name="resolution" value="0" units="1/dev"/>
+          <inkml:channelProperty channel="OA" name="resolution" value="1000" units="1/deg"/>
+          <inkml:channelProperty channel="OE" name="resolution" value="1000" units="1/deg"/>
+        </inkml:channelProperties>
+      </inkml:inkSource>
+      <inkml:timestamp xml:id="ts0" timeString="2021-03-12T19:01:05.135"/>
+    </inkml:context>
+    <inkml:brush xml:id="br0">
+      <inkml:brushProperty name="width" value="0.05" units="cm"/>
+      <inkml:brushProperty name="height" value="0.05" units="cm"/>
+      <inkml:brushProperty name="color" value="#004F8B"/>
+    </inkml:brush>
+  </inkml:definitions>
+  <inkml:trace contextRef="#ctx0" brushRef="#br0">87 13 12440 0 0,'3'-12'8074'0'0,"1"21"-4514"0"0,0 0-3124 0 0,1 23 516 0 0,0-1 0 0 0,-1 40 0 0 0,-1-2-399 0 0,0 14-236 0 0,0 10-213 0 0,6 23-309 0 0,-6-102 19 0 0,0-5-2773 0 0</inkml:trace>
+  <inkml:trace contextRef="#ctx0" brushRef="#br0" timeOffset="0.99">0 304 16128 0 0,'0'0'1459'0'0,"9"2"-873"0"0,2-2 1879 0 0,1 0 1 0 0,0-1-1 0 0,18-3 1 0 0,20 0-759 0 0,-33 3-1873 0 0,0 2 1 0 0,1 1 0 0 0,-1 0-1 0 0,22 6 1 0 0,7 2-3479 0 0,-35-7 1252 0 0</inkml:trace>
+</inkml:ink>
+</file>
+
+<file path=ppt/ink/ink2.xml><?xml version="1.0" encoding="utf-8"?>
+<inkml:ink xmlns:inkml="http://www.w3.org/2003/InkML">
+  <inkml:definitions>
+    <inkml:context xml:id="ctx0">
+      <inkml:inkSource xml:id="inkSrc0">
+        <inkml:traceFormat>
+          <inkml:channel name="X" type="integer" min="-2.14748E9" max="2.14748E9" units="cm"/>
+          <inkml:channel name="Y" type="integer" min="-2.14748E9" max="2.14748E9" units="cm"/>
+          <inkml:channel name="F" type="integer" max="32767" units="dev"/>
+          <inkml:channel name="OA" type="integer" max="360" units="deg"/>
+          <inkml:channel name="OE" type="integer" max="90" units="deg"/>
+        </inkml:traceFormat>
+        <inkml:channelProperties>
+          <inkml:channelProperty channel="X" name="resolution" value="1000" units="1/cm"/>
+          <inkml:channelProperty channel="Y" name="resolution" value="1000" units="1/cm"/>
+          <inkml:channelProperty channel="F" name="resolution" value="0" units="1/dev"/>
+          <inkml:channelProperty channel="OA" name="resolution" value="1000" units="1/deg"/>
+          <inkml:channelProperty channel="OE" name="resolution" value="1000" units="1/deg"/>
+        </inkml:channelProperties>
+      </inkml:inkSource>
+      <inkml:timestamp xml:id="ts0" timeString="2021-03-12T19:00:44.004"/>
+    </inkml:context>
+    <inkml:brush xml:id="br0">
+      <inkml:brushProperty name="width" value="0.05" units="cm"/>
+      <inkml:brushProperty name="height" value="0.05" units="cm"/>
+      <inkml:brushProperty name="color" value="#004F8B"/>
+    </inkml:brush>
+  </inkml:definitions>
+  <inkml:trace contextRef="#ctx0" brushRef="#br0">350 1 12296 0 0,'0'0'1225'0'0,"-1"1"-1118"0"0,0 0-115 0 0,-31 50 1219 0 0,20-32-381 0 0,1 2-1 0 0,-9 22 0 0 0,-50 108 274 0 0,28-66-582 0 0,-22 36 901 0 0,40-79-772 0 0,20-34-453 0 0,-1 0 0 0 0,0-1 0 0 0,-1 0 0 0 0,-6 8-1 0 0,11-14 143 0 0,0-2-310 0 0,1 1-1 0 0,-1 0 1 0 0,1 0-1 0 0,0-1 1 0 0,-1 1-1 0 0,1 0 1 0 0,-1 0-1 0 0,1-1 1 0 0,0 1-1 0 0,-1-1 1 0 0,1 1 0 0 0,0 0-1 0 0,-1-1 1 0 0,1 1-1 0 0,0-1 1 0 0,0 1-1 0 0,-1-1 1 0 0,1 1-1 0 0,0 0 1 0 0,0-1-1 0 0,0 1 1 0 0,0-1 0 0 0,0 1-1 0 0,0-1 1 0 0,0 1-1 0 0,-1-1 1 0 0,2 0-1 0 0,-2-15 315 0 0,1 16-312 0 0,0-11 93 0 0,2 0 0 0 0,-1 0-1 0 0,2 1 1 0 0,-1-1 0 0 0,8-17-1 0 0,-6 18-48 0 0,-1 0-1 0 0,0-1 1 0 0,0 1-1 0 0,-1-1 1 0 0,1-18 0 0 0,-6 16-54 0 0,3 13-20 0 0,0 0 0 0 0,0 0 0 0 0,0 0 0 0 0,0 0 0 0 0,-1 0 0 0 0,1 0 0 0 0,0 0 0 0 0,0 0 0 0 0,0 0 0 0 0,0 0 0 0 0,-1 0 0 0 0,1 0 0 0 0,0 0 0 0 0,0 0 0 0 0,0 0 0 0 0,-1 0 0 0 0,1 0 0 0 0,0 0 0 0 0,0 0 0 0 0,0 0 0 0 0,0 0 0 0 0,-1 0 0 0 0,1 1 0 0 0,0-1 0 0 0,0 0 0 0 0,0 0 0 0 0,0 0 0 0 0,0 0 0 0 0,-1 0 0 0 0,1 0 0 0 0,0 1 0 0 0,0-1 0 0 0,0 0 0 0 0,0 0 0 0 0,0 0 0 0 0,0 1 0 0 0,-2 1 2 0 0,0 1-1 0 0,1 0 0 0 0,-1-1 0 0 0,1 1 1 0 0,0 0-1 0 0,-2 6 0 0 0,-5 26-1 0 0,-7 22 5 0 0,-9 81 1 0 0,23-135 30 0 0,1 0 1 0 0,0 0 0 0 0,0 0 0 0 0,0 0 0 0 0,1 0-1 0 0,-1 0 1 0 0,1 0 0 0 0,-1 0 0 0 0,1 0 0 0 0,0 0-1 0 0,0 0 1 0 0,0 0 0 0 0,1 0 0 0 0,-1-1 0 0 0,1 1-1 0 0,2 3 1 0 0,5 5 216 0 0,-8-10-236 0 0,0 0-1 0 0,-1 0 1 0 0,1-1 0 0 0,0 1-1 0 0,-1 0 1 0 0,1 0-1 0 0,0 0 1 0 0,0-1 0 0 0,0 1-1 0 0,-1 0 1 0 0,1-1 0 0 0,0 1-1 0 0,0-1 1 0 0,0 1-1 0 0,0-1 1 0 0,0 1 0 0 0,0-1-1 0 0,0 0 1 0 0,0 0-1 0 0,0 1 1 0 0,1-1 0 0 0,-1 0-1 0 0,0 0 1 0 0,0 0 0 0 0,0 0-1 0 0,0 0 1 0 0,0 0-1 0 0,0 0 1 0 0,0-1 0 0 0,1 1-1 0 0,4-2 39 0 0,-1 1 0 0 0,1-1 1 0 0,-1 0-1 0 0,0-1 0 0 0,0 1 0 0 0,0-1 0 0 0,9-6 0 0 0,32-29 29 0 0,-25 20-204 0 0,7-12-1745 0 0,-20 22 25 0 0</inkml:trace>
+</inkml:ink>
+</file>
+
+<file path=ppt/ink/ink20.xml><?xml version="1.0" encoding="utf-8"?>
+<inkml:ink xmlns:inkml="http://www.w3.org/2003/InkML">
+  <inkml:definitions>
+    <inkml:context xml:id="ctx0">
+      <inkml:inkSource xml:id="inkSrc0">
+        <inkml:traceFormat>
+          <inkml:channel name="X" type="integer" min="-2.14748E9" max="2.14748E9" units="cm"/>
+          <inkml:channel name="Y" type="integer" min="-2.14748E9" max="2.14748E9" units="cm"/>
+          <inkml:channel name="F" type="integer" max="32767" units="dev"/>
+          <inkml:channel name="OA" type="integer" max="360" units="deg"/>
+          <inkml:channel name="OE" type="integer" max="90" units="deg"/>
+        </inkml:traceFormat>
+        <inkml:channelProperties>
+          <inkml:channelProperty channel="X" name="resolution" value="1000" units="1/cm"/>
+          <inkml:channelProperty channel="Y" name="resolution" value="1000" units="1/cm"/>
+          <inkml:channelProperty channel="F" name="resolution" value="0" units="1/dev"/>
+          <inkml:channelProperty channel="OA" name="resolution" value="1000" units="1/deg"/>
+          <inkml:channelProperty channel="OE" name="resolution" value="1000" units="1/deg"/>
+        </inkml:channelProperties>
+      </inkml:inkSource>
+      <inkml:timestamp xml:id="ts0" timeString="2021-03-12T19:01:05.537"/>
+    </inkml:context>
+    <inkml:brush xml:id="br0">
+      <inkml:brushProperty name="width" value="0.05" units="cm"/>
+      <inkml:brushProperty name="height" value="0.05" units="cm"/>
+      <inkml:brushProperty name="color" value="#004F8B"/>
+    </inkml:brush>
+  </inkml:definitions>
+  <inkml:trace contextRef="#ctx0" brushRef="#br0">1 235 18343 0 0,'0'0'838'0'0,"6"-1"276"0"0,-2 0-1031 0 0,-1 0 0 0 0,1 0-1 0 0,-1-1 1 0 0,0 1-1 0 0,1-1 1 0 0,-1 0 0 0 0,0 0-1 0 0,0-1 1 0 0,0 1-1 0 0,3-4 1 0 0,26-30 2745 0 0,-22 24-2139 0 0,-1 1 175 0 0,-1 0 0 0 0,13-23 0 0 0,-18 29-733 0 0,-1 0 0 0 0,1-1 0 0 0,-1 1 0 0 0,0-1 0 0 0,0 0 0 0 0,-1 0 0 0 0,0 0 0 0 0,1-11 0 0 0,-2 16-126 0 0,0 1 0 0 0,0 0-1 0 0,0-1 1 0 0,1 1 0 0 0,-1-1-1 0 0,0 1 1 0 0,-1 0 0 0 0,1-1-1 0 0,0 1 1 0 0,0-1 0 0 0,0 1-1 0 0,0 0 1 0 0,0-1 0 0 0,0 1-1 0 0,0 0 1 0 0,-1-1-1 0 0,1 1 1 0 0,0-1 0 0 0,0 1-1 0 0,0 0 1 0 0,-1-1 0 0 0,1 1-1 0 0,0 0 1 0 0,-1 0 0 0 0,1-1-1 0 0,0 1 1 0 0,0 0 0 0 0,-1 0-1 0 0,1-1 1 0 0,-1 1 0 0 0,1 0-1 0 0,0 0 1 0 0,-1 0-1 0 0,0 0 6 0 0,0 0-1 0 0,0 0 0 0 0,0 0 0 0 0,-1 0 0 0 0,1 0 0 0 0,0 1 0 0 0,0-1 0 0 0,0 0 0 0 0,0 1 0 0 0,0-1 0 0 0,0 1 0 0 0,-1 0 0 0 0,-3 3 25 0 0,0-1-1 0 0,0 1 1 0 0,-7 7 0 0 0,3 0-29 0 0,0 1 0 0 0,0-1-1 0 0,-11 23 1 0 0,16-27-7 0 0,1 0 0 0 0,0 0 0 0 0,0 0 0 0 0,0 0-1 0 0,1 1 1 0 0,0-1 0 0 0,1 1 0 0 0,-1 13 0 0 0,1-19 2 0 0,2 1 1 0 0,-1 0-1 0 0,0 0 0 0 0,0-1 1 0 0,1 1-1 0 0,0 0 0 0 0,-1 0 1 0 0,1-1-1 0 0,0 1 0 0 0,0-1 1 0 0,1 1-1 0 0,1 3 0 0 0,-1-4-217 0 0,-1-1 0 0 0,1 1 0 0 0,0 0-1 0 0,0-1 1 0 0,-1 1 0 0 0,1-1 0 0 0,0 1 0 0 0,1-1-1 0 0,-1 0 1 0 0,0 0 0 0 0,0 0 0 0 0,0 0-1 0 0,1-1 1 0 0,-1 1 0 0 0,0 0 0 0 0,1-1 0 0 0,-1 0-1 0 0,5 1 1 0 0,-1-1-441 0 0,0-1 1 0 0,1 1-1 0 0,-1-1 1 0 0,0 0-1 0 0,0-1 1 0 0,0 1-1 0 0,0-1 0 0 0,0 0 1 0 0,0-1-1 0 0,-1 1 1 0 0,1-1-1 0 0,8-6 1 0 0,9-13-1807 0 0</inkml:trace>
+  <inkml:trace contextRef="#ctx0" brushRef="#br0" timeOffset="1">448 14 4144 0 0,'-12'-10'-477'0'0,"-1"6"3627"0"0,11 5-2227 0 0,0-1 0 0 0,-1 0 1 0 0,1 1-1 0 0,0-1 0 0 0,0 1 1 0 0,0 0-1 0 0,0 0 0 0 0,0 0 1 0 0,1 0-1 0 0,-1 0 0 0 0,0 0 1 0 0,-2 2-1 0 0,1-1 426 0 0,0 1-1 0 0,0 0 1 0 0,0 0-1 0 0,1 0 1 0 0,-1 0 0 0 0,1 0-1 0 0,0 0 1 0 0,-2 4-1 0 0,3-5-1522 0 0,0 0 0 0 0,0 0 0 0 0,0 1 0 0 0,1-1-1 0 0,-1 0 1 0 0,1 0 0 0 0,-1 0 0 0 0,1 3 0 0 0,0-3 224 0 0,1-1 0 0 0,-1 1 0 0 0,1-1 1 0 0,0 1-1 0 0,-1-1 0 0 0,1 0 0 0 0,0 1 1 0 0,0-1-1 0 0,0 0 0 0 0,0 0 0 0 0,0 0 0 0 0,0 1 1 0 0,0-1-1 0 0,0 0 0 0 0,1-1 0 0 0,-1 1 0 0 0,0 0 1 0 0,1 0-1 0 0,0 0 0 0 0,30 15 376 0 0,-30-15-391 0 0,8 3 94 0 0,-6-2-14 0 0,1 1 0 0 0,0-2 0 0 0,0 1 0 0 0,5 1 0 0 0,-9-3-113 0 0,-1 0 1 0 0,1 0-1 0 0,-1 0 0 0 0,1 0 1 0 0,-1 0-1 0 0,1 1 0 0 0,-1-1 1 0 0,0 0-1 0 0,1 0 0 0 0,-1 1 1 0 0,1-1-1 0 0,-1 0 0 0 0,0 0 1 0 0,1 1-1 0 0,-1-1 0 0 0,0 0 1 0 0,1 1-1 0 0,-1-1 0 0 0,0 0 1 0 0,1 1-1 0 0,-1-1 0 0 0,0 1 1 0 0,0-1-1 0 0,0 1 0 0 0,1-1 1 0 0,-1 1-1 0 0,0 1 3 0 0,0-1-1 0 0,0 0 1 0 0,0 1-1 0 0,0-1 1 0 0,0 0-1 0 0,0 1 1 0 0,0-1-1 0 0,-1 0 1 0 0,0 3-1 0 0,-1 1 3 0 0,0 0 0 0 0,0-1 1 0 0,-1 1-1 0 0,-3 5 0 0 0,0-1-485 0 0,0-1-1 0 0,-1 1 1 0 0,0-1 0 0 0,-1 0-1 0 0,0-1 1 0 0,0 1 0 0 0,-1-2-1 0 0,0 1 1 0 0,0-1 0 0 0,0-1-1 0 0,-1 1 1 0 0,-11 3 0 0 0</inkml:trace>
+</inkml:ink>
+</file>
+
+<file path=ppt/ink/ink21.xml><?xml version="1.0" encoding="utf-8"?>
+<inkml:ink xmlns:inkml="http://www.w3.org/2003/InkML">
+  <inkml:definitions>
+    <inkml:context xml:id="ctx0">
+      <inkml:inkSource xml:id="inkSrc0">
+        <inkml:traceFormat>
+          <inkml:channel name="X" type="integer" min="-2.14748E9" max="2.14748E9" units="cm"/>
+          <inkml:channel name="Y" type="integer" min="-2.14748E9" max="2.14748E9" units="cm"/>
+          <inkml:channel name="F" type="integer" max="32767" units="dev"/>
+          <inkml:channel name="OA" type="integer" max="360" units="deg"/>
+          <inkml:channel name="OE" type="integer" max="90" units="deg"/>
+        </inkml:traceFormat>
+        <inkml:channelProperties>
+          <inkml:channelProperty channel="X" name="resolution" value="1000" units="1/cm"/>
+          <inkml:channelProperty channel="Y" name="resolution" value="1000" units="1/cm"/>
+          <inkml:channelProperty channel="F" name="resolution" value="0" units="1/dev"/>
+          <inkml:channelProperty channel="OA" name="resolution" value="1000" units="1/deg"/>
+          <inkml:channelProperty channel="OE" name="resolution" value="1000" units="1/deg"/>
+        </inkml:channelProperties>
+      </inkml:inkSource>
+      <inkml:timestamp xml:id="ts0" timeString="2021-03-12T19:01:09.987"/>
+    </inkml:context>
+    <inkml:brush xml:id="br0">
+      <inkml:brushProperty name="width" value="0.05" units="cm"/>
+      <inkml:brushProperty name="height" value="0.05" units="cm"/>
+      <inkml:brushProperty name="color" value="#004F8B"/>
+    </inkml:brush>
+  </inkml:definitions>
+  <inkml:trace contextRef="#ctx0" brushRef="#br0">40 5 1376 0 0,'0'0'7758'0'0,"-25"-4"-2500"0"0,18 4-1599 0 0,-1 2 1507 0 0,18-2-4192 0 0,87 6 1633 0 0,5 0-1990 0 0,-49-8-524 0 0,-31 0-41 0 0,0 2-1 0 0,22 2 1 0 0,3 0 68 0 0,-32-2 16 0 0,24 3 0 0 0,2 1 167 0 0,11 2-22 0 0,-34-4-260 0 0,1 0-1 0 0,0-1 1 0 0,37-3-1 0 0,-31 1 63 0 0,32 1 0 0 0,-51 1 124 0 0,171 20-609 0 0,-92-5 666 0 0,-33-8 22 0 0,1-2-1 0 0,98-3 1 0 0,-114-3-119 0 0,148-2 500 0 0,-49 7-363 0 0,67 19 359 0 0,-149-19-624 0 0,66-2 0 0 0,27 0-60 0 0,-103-2 135 0 0,0 2 1 0 0,1 2-1 0 0,76 18 0 0 0,-108-20-73 0 0,0-1 0 0 0,0-1 1 0 0,17 0-1 0 0,24 2 92 0 0,-34-1 33 0 0,38-1 1 0 0,-43-2-299 0 0,0 1 1 0 0,0 1 0 0 0,-1 0 0 0 0,1 1-1 0 0,19 5 1 0 0,-17-4 661 0 0,14 5-317 0 0,-24-5-325 0 0,-6-2-678 0 0</inkml:trace>
+</inkml:ink>
+</file>
+
+<file path=ppt/ink/ink3.xml><?xml version="1.0" encoding="utf-8"?>
+<inkml:ink xmlns:inkml="http://www.w3.org/2003/InkML">
+  <inkml:definitions>
+    <inkml:context xml:id="ctx0">
+      <inkml:inkSource xml:id="inkSrc0">
+        <inkml:traceFormat>
+          <inkml:channel name="X" type="integer" min="-2.14748E9" max="2.14748E9" units="cm"/>
+          <inkml:channel name="Y" type="integer" min="-2.14748E9" max="2.14748E9" units="cm"/>
+          <inkml:channel name="F" type="integer" max="32767" units="dev"/>
+          <inkml:channel name="OA" type="integer" max="360" units="deg"/>
+          <inkml:channel name="OE" type="integer" max="90" units="deg"/>
+        </inkml:traceFormat>
+        <inkml:channelProperties>
+          <inkml:channelProperty channel="X" name="resolution" value="1000" units="1/cm"/>
+          <inkml:channelProperty channel="Y" name="resolution" value="1000" units="1/cm"/>
+          <inkml:channelProperty channel="F" name="resolution" value="0" units="1/dev"/>
+          <inkml:channelProperty channel="OA" name="resolution" value="1000" units="1/deg"/>
+          <inkml:channelProperty channel="OE" name="resolution" value="1000" units="1/deg"/>
+        </inkml:channelProperties>
+      </inkml:inkSource>
+      <inkml:timestamp xml:id="ts0" timeString="2021-03-12T19:00:45.537"/>
+    </inkml:context>
+    <inkml:brush xml:id="br0">
+      <inkml:brushProperty name="width" value="0.05" units="cm"/>
+      <inkml:brushProperty name="height" value="0.05" units="cm"/>
+      <inkml:brushProperty name="color" value="#004F8B"/>
+    </inkml:brush>
+  </inkml:definitions>
+  <inkml:trace contextRef="#ctx0" brushRef="#br0">81 222 5064 0 0,'-4'1'188'0'0,"0"0"0"0"0,1 0 0 0 0,-1 0 1 0 0,1 0-1 0 0,-1 0 0 0 0,1 0 0 0 0,-5 4 0 0 0,-17 5 5951 0 0,3-2 2936 0 0,32-7-7731 0 0,300 2 2568 0 0,48-6-2536 0 0,97-3 160 0 0,-399 4-1209 0 0,-1-3 0 0 0,60-12 0 0 0,-94 13-269 0 0,-1 0 0 0 0,29-11 0 0 0,-32 7 379 0 0,-14 6-446 0 0,0 1 0 0 0,0-1 0 0 0,0 1 1 0 0,0-1-1 0 0,0 1 0 0 0,0 0 0 0 0,0 1 0 0 0,1-1 0 0 0,4 0 0 0 0,7-1-283 0 0,190 9 372 0 0,-160-7 107 0 0,0-2 1 0 0,46-9-1 0 0,182-28 243 0 0,-123 19-314 0 0,-116 17-82 0 0,1 2-1 0 0,47 5 1 0 0,-12 1 28 0 0,0-2 1 0 0,-1-4-1 0 0,112-14 0 0 0,53-16-84 0 0,79-13 15 0 0,-17 14 7 0 0,-284 31 0 0 0,0-1 0 0 0,0 2 0 0 0,0-1 0 0 0,0 2 0 0 0,-1 0 0 0 0,17 6 0 0 0,-11-4 0 0 0,27 6 0 0 0,92 12 59 0 0,-75-11-31 0 0,-42-7-63 0 0,38 3-1 0 0,-24-4 36 0 0,48 10 0 0 0,-36-5 0 0 0,-34-7 0 0 0,-1-1 0 0 0,19-1 0 0 0,-17 0 0 0 0,32-5 0 0 0,-6 0 0 0 0,275-10 56 0 0,-303 15-52 0 0,0 0 0 0 0,0 1-1 0 0,0 1 1 0 0,0 0 0 0 0,17 6 0 0 0,-15-5-4 0 0,1 0 0 0 0,-1 0 1 0 0,14 1-1 0 0,10-3-179 0 0,-19-1 48 0 0,-1 0 0 0 0,24 5 0 0 0,-35-4 206 0 0,1 0 0 0 0,-1-1-1 0 0,0 0 1 0 0,9-1 0 0 0,16 1 123 0 0,-29 0-245 0 0,0 0 0 0 0,0 0 0 0 0,-1 0 0 0 0,1 1 0 0 0,0-1-1 0 0,0 0 1 0 0,0 1 0 0 0,0-1 0 0 0,-1 0 0 0 0,1 1 0 0 0,0-1 0 0 0,0 1 0 0 0,-1-1 0 0 0,1 1 0 0 0,0 0 0 0 0,-1-1 0 0 0,1 1-1 0 0,-1 0 1 0 0,1-1 0 0 0,-1 1 0 0 0,1 0 0 0 0,-1 0 0 0 0,1-1 0 0 0,-1 1 0 0 0,0 0 0 0 0,1 0 0 0 0,-1 0 0 0 0,0 1-1 0 0,1 1-354 0 0,-1 1 0 0 0,1-1-1 0 0,-1 1 1 0 0,-1-1 0 0 0,1 6-1 0 0,-1-6 155 0 0,1 6-1852 0 0</inkml:trace>
+</inkml:ink>
+</file>
+
+<file path=ppt/ink/ink4.xml><?xml version="1.0" encoding="utf-8"?>
+<inkml:ink xmlns:inkml="http://www.w3.org/2003/InkML">
+  <inkml:definitions>
+    <inkml:context xml:id="ctx0">
+      <inkml:inkSource xml:id="inkSrc0">
+        <inkml:traceFormat>
+          <inkml:channel name="X" type="integer" min="-2.14748E9" max="2.14748E9" units="cm"/>
+          <inkml:channel name="Y" type="integer" min="-2.14748E9" max="2.14748E9" units="cm"/>
+          <inkml:channel name="F" type="integer" max="32767" units="dev"/>
+          <inkml:channel name="OA" type="integer" max="360" units="deg"/>
+          <inkml:channel name="OE" type="integer" max="90" units="deg"/>
+        </inkml:traceFormat>
+        <inkml:channelProperties>
+          <inkml:channelProperty channel="X" name="resolution" value="1000" units="1/cm"/>
+          <inkml:channelProperty channel="Y" name="resolution" value="1000" units="1/cm"/>
+          <inkml:channelProperty channel="F" name="resolution" value="0" units="1/dev"/>
+          <inkml:channelProperty channel="OA" name="resolution" value="1000" units="1/deg"/>
+          <inkml:channelProperty channel="OE" name="resolution" value="1000" units="1/deg"/>
+        </inkml:channelProperties>
+      </inkml:inkSource>
+      <inkml:timestamp xml:id="ts0" timeString="2021-03-12T19:00:46.153"/>
+    </inkml:context>
+    <inkml:brush xml:id="br0">
+      <inkml:brushProperty name="width" value="0.05" units="cm"/>
+      <inkml:brushProperty name="height" value="0.05" units="cm"/>
+      <inkml:brushProperty name="color" value="#004F8B"/>
+    </inkml:brush>
+  </inkml:definitions>
+  <inkml:trace contextRef="#ctx0" brushRef="#br0">324 1 4144 0 0,'-3'18'9503'0'0,"-5"-7"-7106"0"0,-21 51 2596 0 0,-4 7-3591 0 0,-10 25-180 0 0,-96 157-1 0 0,77-142-1704 0 0,56-104-1485 0 0,6-11 32 0 0</inkml:trace>
+</inkml:ink>
+</file>
+
+<file path=ppt/ink/ink5.xml><?xml version="1.0" encoding="utf-8"?>
+<inkml:ink xmlns:inkml="http://www.w3.org/2003/InkML">
+  <inkml:definitions>
+    <inkml:context xml:id="ctx0">
+      <inkml:inkSource xml:id="inkSrc0">
+        <inkml:traceFormat>
+          <inkml:channel name="X" type="integer" min="-2.14748E9" max="2.14748E9" units="cm"/>
+          <inkml:channel name="Y" type="integer" min="-2.14748E9" max="2.14748E9" units="cm"/>
+          <inkml:channel name="F" type="integer" max="32767" units="dev"/>
+          <inkml:channel name="OA" type="integer" max="360" units="deg"/>
+          <inkml:channel name="OE" type="integer" max="90" units="deg"/>
+        </inkml:traceFormat>
+        <inkml:channelProperties>
+          <inkml:channelProperty channel="X" name="resolution" value="1000" units="1/cm"/>
+          <inkml:channelProperty channel="Y" name="resolution" value="1000" units="1/cm"/>
+          <inkml:channelProperty channel="F" name="resolution" value="0" units="1/dev"/>
+          <inkml:channelProperty channel="OA" name="resolution" value="1000" units="1/deg"/>
+          <inkml:channelProperty channel="OE" name="resolution" value="1000" units="1/deg"/>
+        </inkml:channelProperties>
+      </inkml:inkSource>
+      <inkml:timestamp xml:id="ts0" timeString="2021-03-12T19:00:46.559"/>
+    </inkml:context>
+    <inkml:brush xml:id="br0">
+      <inkml:brushProperty name="width" value="0.05" units="cm"/>
+      <inkml:brushProperty name="height" value="0.05" units="cm"/>
+      <inkml:brushProperty name="color" value="#004F8B"/>
+    </inkml:brush>
+  </inkml:definitions>
+  <inkml:trace contextRef="#ctx0" brushRef="#br0">4 209 15776 0 0,'0'-1'72'0'0,"-1"1"0"0"0,1-1 0 0 0,0 0 1 0 0,-1 0-1 0 0,1 0 0 0 0,0 0 0 0 0,-1 1 1 0 0,1-1-1 0 0,0 0 0 0 0,0 0 0 0 0,0 0 1 0 0,0 0-1 0 0,0 0 0 0 0,0 0 0 0 0,0 0 1 0 0,0 0-1 0 0,0 1 0 0 0,0-1 0 0 0,1-1 1 0 0,0-1 45 0 0,0 0 0 0 0,0 1 0 0 0,0-1 0 0 0,1 1 0 0 0,-1 0 0 0 0,3-4 0 0 0,3-2 615 0 0,1 0-1 0 0,10-9 1 0 0,-17 16-644 0 0,96-75 3790 0 0,-81 66-3606 0 0,1-1-1 0 0,0 2 0 0 0,0 1 1 0 0,24-9-1 0 0,-37 16-272 0 0,0 0 0 0 0,0 0 0 0 0,-1 1 0 0 0,1-1 0 0 0,0 1 0 0 0,0 0 0 0 0,0 0 0 0 0,0 0 0 0 0,0 1 0 0 0,-1-1 0 0 0,1 1 0 0 0,0 0 0 0 0,0 0 0 0 0,-1 0 0 0 0,1 1 0 0 0,-1-1 0 0 0,1 1 0 0 0,-1 0 0 0 0,0 0 0 0 0,1 0 0 0 0,-1 0 0 0 0,0 1 0 0 0,0-1 0 0 0,-1 1 0 0 0,4 3 0 0 0,-1-1 0 0 0,-1 1 0 0 0,0 0 0 0 0,0-1 0 0 0,0 2 0 0 0,0-1 0 0 0,-1 0 0 0 0,0 1 0 0 0,0-1 0 0 0,-1 1 0 0 0,0 0 0 0 0,0 0 0 0 0,1 12 0 0 0,4 83-64 0 0,-6-96-222 0 0,-1 1-1 0 0,2-1 1 0 0,2 12-1 0 0,6 5-6599 0 0,-2-10-641 0 0</inkml:trace>
+</inkml:ink>
+</file>
+
+<file path=ppt/ink/ink6.xml><?xml version="1.0" encoding="utf-8"?>
+<inkml:ink xmlns:inkml="http://www.w3.org/2003/InkML">
+  <inkml:definitions>
+    <inkml:context xml:id="ctx0">
+      <inkml:inkSource xml:id="inkSrc0">
+        <inkml:traceFormat>
+          <inkml:channel name="X" type="integer" min="-2.14748E9" max="2.14748E9" units="cm"/>
+          <inkml:channel name="Y" type="integer" min="-2.14748E9" max="2.14748E9" units="cm"/>
+          <inkml:channel name="F" type="integer" max="32767" units="dev"/>
+          <inkml:channel name="OA" type="integer" max="360" units="deg"/>
+          <inkml:channel name="OE" type="integer" max="90" units="deg"/>
+        </inkml:traceFormat>
+        <inkml:channelProperties>
+          <inkml:channelProperty channel="X" name="resolution" value="1000" units="1/cm"/>
+          <inkml:channelProperty channel="Y" name="resolution" value="1000" units="1/cm"/>
+          <inkml:channelProperty channel="F" name="resolution" value="0" units="1/dev"/>
+          <inkml:channelProperty channel="OA" name="resolution" value="1000" units="1/deg"/>
+          <inkml:channelProperty channel="OE" name="resolution" value="1000" units="1/deg"/>
+        </inkml:channelProperties>
+      </inkml:inkSource>
+      <inkml:timestamp xml:id="ts0" timeString="2021-03-12T19:00:50.190"/>
+    </inkml:context>
+    <inkml:brush xml:id="br0">
+      <inkml:brushProperty name="width" value="0.05" units="cm"/>
+      <inkml:brushProperty name="height" value="0.05" units="cm"/>
+      <inkml:brushProperty name="color" value="#004F8B"/>
+    </inkml:brush>
+  </inkml:definitions>
+  <inkml:trace contextRef="#ctx0" brushRef="#br0">1 40 2760 0 0,'0'0'11542'0'0,"10"-3"-10191"0"0,-9 2-1223 0 0,-1 0 0 0 0,1 0 1 0 0,1 0-1 0 0,-1 0 0 0 0,0 0 0 0 0,0 1 0 0 0,0-1 1 0 0,0 0-1 0 0,1 0 0 0 0,-1 1 0 0 0,0-1 0 0 0,0 1 1 0 0,1-1-1 0 0,1 0 0 0 0,11-4 535 0 0,-7 1-421 0 0,0 1 0 0 0,1 0-1 0 0,-1 1 1 0 0,1 0 0 0 0,0 0-1 0 0,-1 1 1 0 0,13-1 0 0 0,58 2 893 0 0,-34 1-933 0 0,44 5 1073 0 0,-2 0-689 0 0,-36-4-201 0 0,67 12 0 0 0,-77-9-209 0 0,8 4-156 0 0,16 2 114 0 0,201 14 769 0 0,123-10 154 0 0,-25 4 66 0 0,-207-8-774 0 0,254-8 1323 0 0,-261-6-1230 0 0,-98 3-2671 0 0,-51 0 1978 0 0,-1 0 0 0 0,0 0 0 0 0,1 0 0 0 0,-1-1 0 0 0,0 1 0 0 0,1 0 0 0 0,-1 0 0 0 0,1-1 0 0 0,-1 1 0 0 0,0-1 0 0 0,1 1 0 0 0,-1 0 0 0 0,1-1 0 0 0,-1 1 0 0 0,0-2 0 0 0,-3-2-1730 0 0,-3 2-203 0 0</inkml:trace>
+</inkml:ink>
+</file>
+
+<file path=ppt/ink/ink7.xml><?xml version="1.0" encoding="utf-8"?>
+<inkml:ink xmlns:inkml="http://www.w3.org/2003/InkML">
+  <inkml:definitions>
+    <inkml:context xml:id="ctx0">
+      <inkml:inkSource xml:id="inkSrc0">
+        <inkml:traceFormat>
+          <inkml:channel name="X" type="integer" min="-2.14748E9" max="2.14748E9" units="cm"/>
+          <inkml:channel name="Y" type="integer" min="-2.14748E9" max="2.14748E9" units="cm"/>
+          <inkml:channel name="F" type="integer" max="32767" units="dev"/>
+          <inkml:channel name="OA" type="integer" max="360" units="deg"/>
+          <inkml:channel name="OE" type="integer" max="90" units="deg"/>
+        </inkml:traceFormat>
+        <inkml:channelProperties>
+          <inkml:channelProperty channel="X" name="resolution" value="1000" units="1/cm"/>
+          <inkml:channelProperty channel="Y" name="resolution" value="1000" units="1/cm"/>
+          <inkml:channelProperty channel="F" name="resolution" value="0" units="1/dev"/>
+          <inkml:channelProperty channel="OA" name="resolution" value="1000" units="1/deg"/>
+          <inkml:channelProperty channel="OE" name="resolution" value="1000" units="1/deg"/>
+        </inkml:channelProperties>
+      </inkml:inkSource>
+      <inkml:timestamp xml:id="ts0" timeString="2021-03-12T19:00:54.028"/>
+    </inkml:context>
+    <inkml:brush xml:id="br0">
+      <inkml:brushProperty name="width" value="0.05" units="cm"/>
+      <inkml:brushProperty name="height" value="0.05" units="cm"/>
+      <inkml:brushProperty name="color" value="#004F8B"/>
+    </inkml:brush>
+  </inkml:definitions>
+  <inkml:trace contextRef="#ctx0" brushRef="#br0">4 111 2760 0 0,'-4'5'7237'0'0,"5"-5"-6377"0"0,20-7 2668 0 0,-20 7-2993 0 0,1 0 1 0 0,50 7 3078 0 0,-28-3-1989 0 0,37 0 0 0 0,-22-1-1068 0 0,134 2 341 0 0,-41-3-575 0 0,130 8 666 0 0,41 22-186 0 0,-127-20-375 0 0,-61-6-221 0 0,-59-5-20 0 0,81-7 0 0 0,-103 3-119 0 0,255-10 300 0 0,-210 9-293 0 0,146-26-1 0 0,-156 19-31 0 0,38-10 32 0 0,34-5-22 0 0,-65 18-48 0 0,127 3 1 0 0,-202 5-6 0 0,336 6 53 0 0,-232-8 52 0 0,32-1 65 0 0,75 1 6 0 0,-108 3-118 0 0,122 9-47 0 0,-25 8 130 0 0,-34-9 254 0 0,-92-6-96 0 0,1-3-1 0 0,139-20 1 0 0,42-32 251 0 0,-171 34-449 0 0,1 6-51 0 0,-39 7 6 0 0,-24 7-815 0 0,-5 1-3611 0 0</inkml:trace>
+</inkml:ink>
+</file>
+
+<file path=ppt/ink/ink8.xml><?xml version="1.0" encoding="utf-8"?>
+<inkml:ink xmlns:inkml="http://www.w3.org/2003/InkML">
+  <inkml:definitions>
+    <inkml:context xml:id="ctx0">
+      <inkml:inkSource xml:id="inkSrc0">
+        <inkml:traceFormat>
+          <inkml:channel name="X" type="integer" min="-2.14748E9" max="2.14748E9" units="cm"/>
+          <inkml:channel name="Y" type="integer" min="-2.14748E9" max="2.14748E9" units="cm"/>
+          <inkml:channel name="F" type="integer" max="32767" units="dev"/>
+          <inkml:channel name="OA" type="integer" max="360" units="deg"/>
+          <inkml:channel name="OE" type="integer" max="90" units="deg"/>
+        </inkml:traceFormat>
+        <inkml:channelProperties>
+          <inkml:channelProperty channel="X" name="resolution" value="1000" units="1/cm"/>
+          <inkml:channelProperty channel="Y" name="resolution" value="1000" units="1/cm"/>
+          <inkml:channelProperty channel="F" name="resolution" value="0" units="1/dev"/>
+          <inkml:channelProperty channel="OA" name="resolution" value="1000" units="1/deg"/>
+          <inkml:channelProperty channel="OE" name="resolution" value="1000" units="1/deg"/>
+        </inkml:channelProperties>
+      </inkml:inkSource>
+      <inkml:timestamp xml:id="ts0" timeString="2021-03-12T19:00:55.478"/>
+    </inkml:context>
+    <inkml:brush xml:id="br0">
+      <inkml:brushProperty name="width" value="0.05" units="cm"/>
+      <inkml:brushProperty name="height" value="0.05" units="cm"/>
+      <inkml:brushProperty name="color" value="#004F8B"/>
+    </inkml:brush>
+  </inkml:definitions>
+  <inkml:trace contextRef="#ctx0" brushRef="#br0">71 162 8752 0 0,'-18'-6'957'0'0,"-12"-6"-537"0"0,18 3 2950 0 0,3-6 4508 0 0,9 14-7711 0 0,0 0 1 0 0,-1 0 0 0 0,1 0 0 0 0,0 0-1 0 0,0 0 1 0 0,0 0 0 0 0,0-1-1 0 0,0 1 1 0 0,0 0 0 0 0,0 0 0 0 0,1 0-1 0 0,-1 0 1 0 0,0 0 0 0 0,1 0-1 0 0,-1 0 1 0 0,1 0 0 0 0,-1 0 0 0 0,1 0-1 0 0,-1 0 1 0 0,1 0 0 0 0,0 0-1 0 0,-1 0 1 0 0,1 0 0 0 0,0 0 0 0 0,0 1-1 0 0,0-1 1 0 0,-1 0 0 0 0,1 0-1 0 0,1 0 1 0 0,4-3 96 0 0,-1 1-1 0 0,1 0 1 0 0,9-4 0 0 0,-14 6-197 0 0,27-9 139 0 0,0 1-1 0 0,1 2 1 0 0,57-8 0 0 0,-49 9-147 0 0,4-2-13 0 0,-7 1-15 0 0,37-1 0 0 0,-61 7-16 0 0,-1 1-1 0 0,0 0 1 0 0,0 0 0 0 0,1 1 0 0 0,-1 1 0 0 0,0 0 0 0 0,0 0 0 0 0,0 0 0 0 0,8 5-1 0 0,-13-5-3 0 0,0 0 0 0 0,-1 0 0 0 0,0 0 0 0 0,1 1 0 0 0,-1-1 0 0 0,0 1 0 0 0,0 0 0 0 0,-1 0 0 0 0,1 0 0 0 0,-1 0-1 0 0,1 1 1 0 0,-1-1 0 0 0,0 1 0 0 0,0-1 0 0 0,-1 1 0 0 0,1 0 0 0 0,-1 0 0 0 0,1-1 0 0 0,-1 1 0 0 0,-1 0 0 0 0,1 0-1 0 0,0 0 1 0 0,-1 8 0 0 0,0 7 144 0 0,0-1-1 0 0,-2 1 0 0 0,-6 33 1 0 0,6-42-127 0 0,-42 196-444 0 0,8-39 335 0 0,-18 204 550 0 0,50-311-357 0 0,3 0 1 0 0,2 0 0 0 0,4 0-1 0 0,14 76 1 0 0,-16-118-68 0 0,2-1-1 0 0,0 0 1 0 0,0 0-1 0 0,2-1 1 0 0,0 1 0 0 0,1-1-1 0 0,0-1 1 0 0,1 1-1 0 0,1-1 1 0 0,1-1-1 0 0,0 0 1 0 0,1-1-1 0 0,22 20 1 0 0,-16-18 32 0 0,-4-4 4 0 0,23 24 0 0 0,-34-32-51 0 0,0 1 1 0 0,0-1 0 0 0,0 1 0 0 0,-1 0 0 0 0,1 0-1 0 0,-1 0 1 0 0,0 1 0 0 0,0-1 0 0 0,-1 0-1 0 0,1 1 1 0 0,1 8 0 0 0,-3-9 4 0 0,0-1 1 0 0,0 1-1 0 0,-1-1 0 0 0,1 1 0 0 0,-1-1 1 0 0,0 1-1 0 0,0-1 0 0 0,0 0 0 0 0,-1 0 1 0 0,1 1-1 0 0,-1-1 0 0 0,1 0 0 0 0,-1 0 1 0 0,0 0-1 0 0,0-1 0 0 0,0 1 0 0 0,-1 0 1 0 0,-4 3-1 0 0,-3 3 49 0 0,0 0 0 0 0,-1 0-1 0 0,-16 8 1 0 0,-1 0-233 0 0,-2-2 0 0 0,0-1-1 0 0,0-1 1 0 0,-1-2 0 0 0,-1-1-1 0 0,-45 8 1 0 0,49-9-2944 0 0,24-8 1666 0 0</inkml:trace>
+</inkml:ink>
+</file>
+
+<file path=ppt/ink/ink9.xml><?xml version="1.0" encoding="utf-8"?>
+<inkml:ink xmlns:inkml="http://www.w3.org/2003/InkML">
+  <inkml:definitions>
+    <inkml:context xml:id="ctx0">
+      <inkml:inkSource xml:id="inkSrc0">
+        <inkml:traceFormat>
+          <inkml:channel name="X" type="integer" min="-2.14748E9" max="2.14748E9" units="cm"/>
+          <inkml:channel name="Y" type="integer" min="-2.14748E9" max="2.14748E9" units="cm"/>
+          <inkml:channel name="F" type="integer" max="32767" units="dev"/>
+          <inkml:channel name="OA" type="integer" max="360" units="deg"/>
+          <inkml:channel name="OE" type="integer" max="90" units="deg"/>
+        </inkml:traceFormat>
+        <inkml:channelProperties>
+          <inkml:channelProperty channel="X" name="resolution" value="1000" units="1/cm"/>
+          <inkml:channelProperty channel="Y" name="resolution" value="1000" units="1/cm"/>
+          <inkml:channelProperty channel="F" name="resolution" value="0" units="1/dev"/>
+          <inkml:channelProperty channel="OA" name="resolution" value="1000" units="1/deg"/>
+          <inkml:channelProperty channel="OE" name="resolution" value="1000" units="1/deg"/>
+        </inkml:channelProperties>
+      </inkml:inkSource>
+      <inkml:timestamp xml:id="ts0" timeString="2021-03-12T19:00:58.529"/>
+    </inkml:context>
+    <inkml:brush xml:id="br0">
+      <inkml:brushProperty name="width" value="0.05" units="cm"/>
+      <inkml:brushProperty name="height" value="0.05" units="cm"/>
+      <inkml:brushProperty name="color" value="#004F8B"/>
+    </inkml:brush>
+  </inkml:definitions>
+  <inkml:trace contextRef="#ctx0" brushRef="#br0">1 192 3680 0 0,'3'0'11261'0'0,"10"1"-5239"0"0,-5 0-6050 0 0,0-1-1 0 0,16-2 1 0 0,-21 2 93 0 0,0 0-1 0 0,0 0 1 0 0,0 0-1 0 0,0 1 1 0 0,-1-1-1 0 0,6 2 1 0 0,6 0 148 0 0,35 5-31 0 0,-21-5-274 0 0,-18-2 359 0 0,0 1 0 0 0,0-1 1 0 0,15-2-1 0 0,15-1 162 0 0,-31 3-344 0 0,-1 0 0 0 0,1-1 0 0 0,13-3 0 0 0,151-29 963 0 0,-104 22-737 0 0,-61 8-269 0 0,-1 1-1 0 0,1-1 1 0 0,-1 0-1 0 0,0 0 1 0 0,0-1 0 0 0,0 0-1 0 0,0 0 1 0 0,11-10 0 0 0,21-12 136 0 0,-17 15-73 0 0,0 1 0 0 0,28-8 0 0 0,14 0-4 0 0,-41 13-63 0 0,24-1 0 0 0,-13 1 12 0 0,-1 2 23 0 0,38 1 0 0 0,5 0 7 0 0,24-5-16 0 0,173 11 0 0 0,-227-2-40 0 0,-28-2-4 0 0,31 4 0 0 0,54 13-150 0 0,17 20 249 0 0,-60-17-44 0 0,-44-16-75 0 0,-14-4 0 0 0,1 0 0 0 0,-1 1 0 0 0,1 0 0 0 0,0-1 0 0 0,-1 1 0 0 0,0 0 0 0 0,1 0 0 0 0,-1 1 0 0 0,3 1 0 0 0,-1-1 3 0 0,1 1 0 0 0,-1-1-1 0 0,1 1 1 0 0,0-1 0 0 0,0-1 0 0 0,0 1-1 0 0,0-1 1 0 0,5 2 0 0 0,44 3 32 0 0,-35-4-31 0 0,1 0-7 0 0,129 8 70 0 0,-78-5-38 0 0,-48-2 20 0 0,44 0 1 0 0,161-19 321 0 0,-114 9-152 0 0,-93 6-171 0 0,1 1 1 0 0,-1 1-1 0 0,26 4 1 0 0,-8 0 31 0 0,198 9 391 0 0,114 4 874 0 0,-276-9-976 0 0,-52-5-199 0 0,0-1-1 0 0,0-1 1 0 0,42-2 0 0 0,-42-5 9 0 0,7 0-1116 0 0,-12 8-3298 0 0</inkml:trace>
+</inkml:ink>
 </file>
 
 <file path=ppt/notesMasters/notesMaster1.xml><?xml version="1.0" encoding="utf-8"?>
@@ -833,7 +1509,7 @@
           <a:p>
             <a:fld id="{3A2BF66F-FEB0-48C1-A8B9-A73F54BB1A08}" type="datetimeFigureOut">
               <a:rPr lang="en-US" smtClean="0"/>
-              <a:t>3/11/2021</a:t>
+              <a:t>3/12/2021</a:t>
             </a:fld>
             <a:endParaRPr lang="en-US"/>
           </a:p>
@@ -1033,7 +1709,7 @@
           <a:p>
             <a:fld id="{3A2BF66F-FEB0-48C1-A8B9-A73F54BB1A08}" type="datetimeFigureOut">
               <a:rPr lang="en-US" smtClean="0"/>
-              <a:t>3/11/2021</a:t>
+              <a:t>3/12/2021</a:t>
             </a:fld>
             <a:endParaRPr lang="en-US"/>
           </a:p>
@@ -1243,7 +1919,7 @@
           <a:p>
             <a:fld id="{3A2BF66F-FEB0-48C1-A8B9-A73F54BB1A08}" type="datetimeFigureOut">
               <a:rPr lang="en-US" smtClean="0"/>
-              <a:t>3/11/2021</a:t>
+              <a:t>3/12/2021</a:t>
             </a:fld>
             <a:endParaRPr lang="en-US"/>
           </a:p>
@@ -1443,7 +2119,7 @@
           <a:p>
             <a:fld id="{3A2BF66F-FEB0-48C1-A8B9-A73F54BB1A08}" type="datetimeFigureOut">
               <a:rPr lang="en-US" smtClean="0"/>
-              <a:t>3/11/2021</a:t>
+              <a:t>3/12/2021</a:t>
             </a:fld>
             <a:endParaRPr lang="en-US"/>
           </a:p>
@@ -1720,7 +2396,7 @@
           <a:p>
             <a:fld id="{3A2BF66F-FEB0-48C1-A8B9-A73F54BB1A08}" type="datetimeFigureOut">
               <a:rPr lang="en-US" smtClean="0"/>
-              <a:t>3/11/2021</a:t>
+              <a:t>3/12/2021</a:t>
             </a:fld>
             <a:endParaRPr lang="en-US"/>
           </a:p>
@@ -1987,7 +2663,7 @@
           <a:p>
             <a:fld id="{3A2BF66F-FEB0-48C1-A8B9-A73F54BB1A08}" type="datetimeFigureOut">
               <a:rPr lang="en-US" smtClean="0"/>
-              <a:t>3/11/2021</a:t>
+              <a:t>3/12/2021</a:t>
             </a:fld>
             <a:endParaRPr lang="en-US"/>
           </a:p>
@@ -2401,7 +3077,7 @@
           <a:p>
             <a:fld id="{3A2BF66F-FEB0-48C1-A8B9-A73F54BB1A08}" type="datetimeFigureOut">
               <a:rPr lang="en-US" smtClean="0"/>
-              <a:t>3/11/2021</a:t>
+              <a:t>3/12/2021</a:t>
             </a:fld>
             <a:endParaRPr lang="en-US"/>
           </a:p>
@@ -2544,7 +3220,7 @@
           <a:p>
             <a:fld id="{3A2BF66F-FEB0-48C1-A8B9-A73F54BB1A08}" type="datetimeFigureOut">
               <a:rPr lang="en-US" smtClean="0"/>
-              <a:t>3/11/2021</a:t>
+              <a:t>3/12/2021</a:t>
             </a:fld>
             <a:endParaRPr lang="en-US"/>
           </a:p>
@@ -2659,7 +3335,7 @@
           <a:p>
             <a:fld id="{3A2BF66F-FEB0-48C1-A8B9-A73F54BB1A08}" type="datetimeFigureOut">
               <a:rPr lang="en-US" smtClean="0"/>
-              <a:t>3/11/2021</a:t>
+              <a:t>3/12/2021</a:t>
             </a:fld>
             <a:endParaRPr lang="en-US"/>
           </a:p>
@@ -2971,7 +3647,7 @@
           <a:p>
             <a:fld id="{3A2BF66F-FEB0-48C1-A8B9-A73F54BB1A08}" type="datetimeFigureOut">
               <a:rPr lang="en-US" smtClean="0"/>
-              <a:t>3/11/2021</a:t>
+              <a:t>3/12/2021</a:t>
             </a:fld>
             <a:endParaRPr lang="en-US"/>
           </a:p>
@@ -3261,7 +3937,7 @@
           <a:p>
             <a:fld id="{3A2BF66F-FEB0-48C1-A8B9-A73F54BB1A08}" type="datetimeFigureOut">
               <a:rPr lang="en-US" smtClean="0"/>
-              <a:t>3/11/2021</a:t>
+              <a:t>3/12/2021</a:t>
             </a:fld>
             <a:endParaRPr lang="en-US"/>
           </a:p>
@@ -3504,7 +4180,7 @@
           <a:p>
             <a:fld id="{3A2BF66F-FEB0-48C1-A8B9-A73F54BB1A08}" type="datetimeFigureOut">
               <a:rPr lang="en-US" smtClean="0"/>
-              <a:t>3/11/2021</a:t>
+              <a:t>3/12/2021</a:t>
             </a:fld>
             <a:endParaRPr lang="en-US"/>
           </a:p>
@@ -4200,6 +4876,1119 @@
           </a:p>
         </p:txBody>
       </p:sp>
+      <mc:AlternateContent xmlns:mc="http://schemas.openxmlformats.org/markup-compatibility/2006">
+        <mc:Choice xmlns:p14="http://schemas.microsoft.com/office/powerpoint/2010/main" Requires="p14">
+          <p:contentPart p14:bwMode="auto" r:id="rId2">
+            <p14:nvContentPartPr>
+              <p14:cNvPr id="4" name="Ink 3">
+                <a:extLst>
+                  <a:ext uri="{FF2B5EF4-FFF2-40B4-BE49-F238E27FC236}">
+                    <a16:creationId xmlns:a16="http://schemas.microsoft.com/office/drawing/2014/main" id="{B7F5B965-D525-4529-98A8-2FFAD857AFB6}"/>
+                  </a:ext>
+                </a:extLst>
+              </p14:cNvPr>
+              <p14:cNvContentPartPr/>
+              <p14:nvPr/>
+            </p14:nvContentPartPr>
+            <p14:xfrm>
+              <a:off x="871849" y="1722499"/>
+              <a:ext cx="1019160" cy="23760"/>
+            </p14:xfrm>
+          </p:contentPart>
+        </mc:Choice>
+        <mc:Fallback>
+          <p:pic>
+            <p:nvPicPr>
+              <p:cNvPr id="4" name="Ink 3">
+                <a:extLst>
+                  <a:ext uri="{FF2B5EF4-FFF2-40B4-BE49-F238E27FC236}">
+                    <a16:creationId xmlns:a16="http://schemas.microsoft.com/office/drawing/2014/main" id="{B7F5B965-D525-4529-98A8-2FFAD857AFB6}"/>
+                  </a:ext>
+                </a:extLst>
+              </p:cNvPr>
+              <p:cNvPicPr/>
+              <p:nvPr/>
+            </p:nvPicPr>
+            <p:blipFill>
+              <a:blip r:embed="rId3"/>
+              <a:stretch>
+                <a:fillRect/>
+              </a:stretch>
+            </p:blipFill>
+            <p:spPr>
+              <a:xfrm>
+                <a:off x="863209" y="1713499"/>
+                <a:ext cx="1036800" cy="41400"/>
+              </a:xfrm>
+              <a:prstGeom prst="rect">
+                <a:avLst/>
+              </a:prstGeom>
+            </p:spPr>
+          </p:pic>
+        </mc:Fallback>
+      </mc:AlternateContent>
+      <mc:AlternateContent xmlns:mc="http://schemas.openxmlformats.org/markup-compatibility/2006">
+        <mc:Choice xmlns:p14="http://schemas.microsoft.com/office/powerpoint/2010/main" Requires="p14">
+          <p:contentPart p14:bwMode="auto" r:id="rId4">
+            <p14:nvContentPartPr>
+              <p14:cNvPr id="5" name="Ink 4">
+                <a:extLst>
+                  <a:ext uri="{FF2B5EF4-FFF2-40B4-BE49-F238E27FC236}">
+                    <a16:creationId xmlns:a16="http://schemas.microsoft.com/office/drawing/2014/main" id="{29A4F937-8BCF-4DC3-A30A-431E1AF82495}"/>
+                  </a:ext>
+                </a:extLst>
+              </p14:cNvPr>
+              <p14:cNvContentPartPr/>
+              <p14:nvPr/>
+            </p14:nvContentPartPr>
+            <p14:xfrm>
+              <a:off x="3037609" y="1078819"/>
+              <a:ext cx="126360" cy="256680"/>
+            </p14:xfrm>
+          </p:contentPart>
+        </mc:Choice>
+        <mc:Fallback>
+          <p:pic>
+            <p:nvPicPr>
+              <p:cNvPr id="5" name="Ink 4">
+                <a:extLst>
+                  <a:ext uri="{FF2B5EF4-FFF2-40B4-BE49-F238E27FC236}">
+                    <a16:creationId xmlns:a16="http://schemas.microsoft.com/office/drawing/2014/main" id="{29A4F937-8BCF-4DC3-A30A-431E1AF82495}"/>
+                  </a:ext>
+                </a:extLst>
+              </p:cNvPr>
+              <p:cNvPicPr/>
+              <p:nvPr/>
+            </p:nvPicPr>
+            <p:blipFill>
+              <a:blip r:embed="rId5"/>
+              <a:stretch>
+                <a:fillRect/>
+              </a:stretch>
+            </p:blipFill>
+            <p:spPr>
+              <a:xfrm>
+                <a:off x="3028609" y="1070179"/>
+                <a:ext cx="144000" cy="274320"/>
+              </a:xfrm>
+              <a:prstGeom prst="rect">
+                <a:avLst/>
+              </a:prstGeom>
+            </p:spPr>
+          </p:pic>
+        </mc:Fallback>
+      </mc:AlternateContent>
+      <mc:AlternateContent xmlns:mc="http://schemas.openxmlformats.org/markup-compatibility/2006">
+        <mc:Choice xmlns:p14="http://schemas.microsoft.com/office/powerpoint/2010/main" Requires="p14">
+          <p:contentPart p14:bwMode="auto" r:id="rId6">
+            <p14:nvContentPartPr>
+              <p14:cNvPr id="6" name="Ink 5">
+                <a:extLst>
+                  <a:ext uri="{FF2B5EF4-FFF2-40B4-BE49-F238E27FC236}">
+                    <a16:creationId xmlns:a16="http://schemas.microsoft.com/office/drawing/2014/main" id="{FD549639-CA04-4B47-9205-1865A1DEAAA8}"/>
+                  </a:ext>
+                </a:extLst>
+              </p14:cNvPr>
+              <p14:cNvContentPartPr/>
+              <p14:nvPr/>
+            </p14:nvContentPartPr>
+            <p14:xfrm>
+              <a:off x="833689" y="2098339"/>
+              <a:ext cx="1833840" cy="92520"/>
+            </p14:xfrm>
+          </p:contentPart>
+        </mc:Choice>
+        <mc:Fallback>
+          <p:pic>
+            <p:nvPicPr>
+              <p:cNvPr id="6" name="Ink 5">
+                <a:extLst>
+                  <a:ext uri="{FF2B5EF4-FFF2-40B4-BE49-F238E27FC236}">
+                    <a16:creationId xmlns:a16="http://schemas.microsoft.com/office/drawing/2014/main" id="{FD549639-CA04-4B47-9205-1865A1DEAAA8}"/>
+                  </a:ext>
+                </a:extLst>
+              </p:cNvPr>
+              <p:cNvPicPr/>
+              <p:nvPr/>
+            </p:nvPicPr>
+            <p:blipFill>
+              <a:blip r:embed="rId7"/>
+              <a:stretch>
+                <a:fillRect/>
+              </a:stretch>
+            </p:blipFill>
+            <p:spPr>
+              <a:xfrm>
+                <a:off x="825049" y="2089339"/>
+                <a:ext cx="1851480" cy="110160"/>
+              </a:xfrm>
+              <a:prstGeom prst="rect">
+                <a:avLst/>
+              </a:prstGeom>
+            </p:spPr>
+          </p:pic>
+        </mc:Fallback>
+      </mc:AlternateContent>
+      <p:grpSp>
+        <p:nvGrpSpPr>
+          <p:cNvPr id="9" name="Group 8">
+            <a:extLst>
+              <a:ext uri="{FF2B5EF4-FFF2-40B4-BE49-F238E27FC236}">
+                <a16:creationId xmlns:a16="http://schemas.microsoft.com/office/drawing/2014/main" id="{CBDFB31C-5801-47A6-8DF1-BD4FF6F782F2}"/>
+              </a:ext>
+            </a:extLst>
+          </p:cNvPr>
+          <p:cNvGrpSpPr/>
+          <p:nvPr/>
+        </p:nvGrpSpPr>
+        <p:grpSpPr>
+          <a:xfrm>
+            <a:off x="3554569" y="2164579"/>
+            <a:ext cx="166680" cy="268560"/>
+            <a:chOff x="3554569" y="2164579"/>
+            <a:chExt cx="166680" cy="268560"/>
+          </a:xfrm>
+        </p:grpSpPr>
+        <mc:AlternateContent xmlns:mc="http://schemas.openxmlformats.org/markup-compatibility/2006">
+          <mc:Choice xmlns:p14="http://schemas.microsoft.com/office/powerpoint/2010/main" Requires="p14">
+            <p:contentPart p14:bwMode="auto" r:id="rId8">
+              <p14:nvContentPartPr>
+                <p14:cNvPr id="7" name="Ink 6">
+                  <a:extLst>
+                    <a:ext uri="{FF2B5EF4-FFF2-40B4-BE49-F238E27FC236}">
+                      <a16:creationId xmlns:a16="http://schemas.microsoft.com/office/drawing/2014/main" id="{10B5ED68-0525-4E84-9F59-5784B84FDF34}"/>
+                    </a:ext>
+                  </a:extLst>
+                </p14:cNvPr>
+                <p14:cNvContentPartPr/>
+                <p14:nvPr/>
+              </p14:nvContentPartPr>
+              <p14:xfrm>
+                <a:off x="3554569" y="2209939"/>
+                <a:ext cx="117000" cy="223200"/>
+              </p14:xfrm>
+            </p:contentPart>
+          </mc:Choice>
+          <mc:Fallback>
+            <p:pic>
+              <p:nvPicPr>
+                <p:cNvPr id="7" name="Ink 6">
+                  <a:extLst>
+                    <a:ext uri="{FF2B5EF4-FFF2-40B4-BE49-F238E27FC236}">
+                      <a16:creationId xmlns:a16="http://schemas.microsoft.com/office/drawing/2014/main" id="{10B5ED68-0525-4E84-9F59-5784B84FDF34}"/>
+                    </a:ext>
+                  </a:extLst>
+                </p:cNvPr>
+                <p:cNvPicPr/>
+                <p:nvPr/>
+              </p:nvPicPr>
+              <p:blipFill>
+                <a:blip r:embed="rId9"/>
+                <a:stretch>
+                  <a:fillRect/>
+                </a:stretch>
+              </p:blipFill>
+              <p:spPr>
+                <a:xfrm>
+                  <a:off x="3545929" y="2201299"/>
+                  <a:ext cx="134640" cy="240840"/>
+                </a:xfrm>
+                <a:prstGeom prst="rect">
+                  <a:avLst/>
+                </a:prstGeom>
+              </p:spPr>
+            </p:pic>
+          </mc:Fallback>
+        </mc:AlternateContent>
+        <mc:AlternateContent xmlns:mc="http://schemas.openxmlformats.org/markup-compatibility/2006">
+          <mc:Choice xmlns:p14="http://schemas.microsoft.com/office/powerpoint/2010/main" Requires="p14">
+            <p:contentPart p14:bwMode="auto" r:id="rId10">
+              <p14:nvContentPartPr>
+                <p14:cNvPr id="8" name="Ink 7">
+                  <a:extLst>
+                    <a:ext uri="{FF2B5EF4-FFF2-40B4-BE49-F238E27FC236}">
+                      <a16:creationId xmlns:a16="http://schemas.microsoft.com/office/drawing/2014/main" id="{37EAB131-B856-4230-8139-58994FDE3519}"/>
+                    </a:ext>
+                  </a:extLst>
+                </p14:cNvPr>
+                <p14:cNvContentPartPr/>
+                <p14:nvPr/>
+              </p14:nvContentPartPr>
+              <p14:xfrm>
+                <a:off x="3569329" y="2164579"/>
+                <a:ext cx="151920" cy="108720"/>
+              </p14:xfrm>
+            </p:contentPart>
+          </mc:Choice>
+          <mc:Fallback>
+            <p:pic>
+              <p:nvPicPr>
+                <p:cNvPr id="8" name="Ink 7">
+                  <a:extLst>
+                    <a:ext uri="{FF2B5EF4-FFF2-40B4-BE49-F238E27FC236}">
+                      <a16:creationId xmlns:a16="http://schemas.microsoft.com/office/drawing/2014/main" id="{37EAB131-B856-4230-8139-58994FDE3519}"/>
+                    </a:ext>
+                  </a:extLst>
+                </p:cNvPr>
+                <p:cNvPicPr/>
+                <p:nvPr/>
+              </p:nvPicPr>
+              <p:blipFill>
+                <a:blip r:embed="rId11"/>
+                <a:stretch>
+                  <a:fillRect/>
+                </a:stretch>
+              </p:blipFill>
+              <p:spPr>
+                <a:xfrm>
+                  <a:off x="3560689" y="2155939"/>
+                  <a:ext cx="169560" cy="126360"/>
+                </a:xfrm>
+                <a:prstGeom prst="rect">
+                  <a:avLst/>
+                </a:prstGeom>
+              </p:spPr>
+            </p:pic>
+          </mc:Fallback>
+        </mc:AlternateContent>
+      </p:grpSp>
+      <mc:AlternateContent xmlns:mc="http://schemas.openxmlformats.org/markup-compatibility/2006">
+        <mc:Choice xmlns:p14="http://schemas.microsoft.com/office/powerpoint/2010/main" Requires="p14">
+          <p:contentPart p14:bwMode="auto" r:id="rId12">
+            <p14:nvContentPartPr>
+              <p14:cNvPr id="10" name="Ink 9">
+                <a:extLst>
+                  <a:ext uri="{FF2B5EF4-FFF2-40B4-BE49-F238E27FC236}">
+                    <a16:creationId xmlns:a16="http://schemas.microsoft.com/office/drawing/2014/main" id="{92A42271-7CBB-4A8B-AF32-3875AF589018}"/>
+                  </a:ext>
+                </a:extLst>
+              </p14:cNvPr>
+              <p14:cNvContentPartPr/>
+              <p14:nvPr/>
+            </p14:nvContentPartPr>
+            <p14:xfrm>
+              <a:off x="2887129" y="2922019"/>
+              <a:ext cx="904680" cy="46080"/>
+            </p14:xfrm>
+          </p:contentPart>
+        </mc:Choice>
+        <mc:Fallback>
+          <p:pic>
+            <p:nvPicPr>
+              <p:cNvPr id="10" name="Ink 9">
+                <a:extLst>
+                  <a:ext uri="{FF2B5EF4-FFF2-40B4-BE49-F238E27FC236}">
+                    <a16:creationId xmlns:a16="http://schemas.microsoft.com/office/drawing/2014/main" id="{92A42271-7CBB-4A8B-AF32-3875AF589018}"/>
+                  </a:ext>
+                </a:extLst>
+              </p:cNvPr>
+              <p:cNvPicPr/>
+              <p:nvPr/>
+            </p:nvPicPr>
+            <p:blipFill>
+              <a:blip r:embed="rId13"/>
+              <a:stretch>
+                <a:fillRect/>
+              </a:stretch>
+            </p:blipFill>
+            <p:spPr>
+              <a:xfrm>
+                <a:off x="2878489" y="2913379"/>
+                <a:ext cx="922320" cy="63720"/>
+              </a:xfrm>
+              <a:prstGeom prst="rect">
+                <a:avLst/>
+              </a:prstGeom>
+            </p:spPr>
+          </p:pic>
+        </mc:Fallback>
+      </mc:AlternateContent>
+      <mc:AlternateContent xmlns:mc="http://schemas.openxmlformats.org/markup-compatibility/2006">
+        <mc:Choice xmlns:p14="http://schemas.microsoft.com/office/powerpoint/2010/main" Requires="p14">
+          <p:contentPart p14:bwMode="auto" r:id="rId14">
+            <p14:nvContentPartPr>
+              <p14:cNvPr id="11" name="Ink 10">
+                <a:extLst>
+                  <a:ext uri="{FF2B5EF4-FFF2-40B4-BE49-F238E27FC236}">
+                    <a16:creationId xmlns:a16="http://schemas.microsoft.com/office/drawing/2014/main" id="{9C44F192-3957-48E1-8D61-EF28322F30EC}"/>
+                  </a:ext>
+                </a:extLst>
+              </p14:cNvPr>
+              <p14:cNvContentPartPr/>
+              <p14:nvPr/>
+            </p14:nvContentPartPr>
+            <p14:xfrm>
+              <a:off x="1669609" y="3207499"/>
+              <a:ext cx="1855800" cy="70200"/>
+            </p14:xfrm>
+          </p:contentPart>
+        </mc:Choice>
+        <mc:Fallback>
+          <p:pic>
+            <p:nvPicPr>
+              <p:cNvPr id="11" name="Ink 10">
+                <a:extLst>
+                  <a:ext uri="{FF2B5EF4-FFF2-40B4-BE49-F238E27FC236}">
+                    <a16:creationId xmlns:a16="http://schemas.microsoft.com/office/drawing/2014/main" id="{9C44F192-3957-48E1-8D61-EF28322F30EC}"/>
+                  </a:ext>
+                </a:extLst>
+              </p:cNvPr>
+              <p:cNvPicPr/>
+              <p:nvPr/>
+            </p:nvPicPr>
+            <p:blipFill>
+              <a:blip r:embed="rId15"/>
+              <a:stretch>
+                <a:fillRect/>
+              </a:stretch>
+            </p:blipFill>
+            <p:spPr>
+              <a:xfrm>
+                <a:off x="1660609" y="3198859"/>
+                <a:ext cx="1873440" cy="87840"/>
+              </a:xfrm>
+              <a:prstGeom prst="rect">
+                <a:avLst/>
+              </a:prstGeom>
+            </p:spPr>
+          </p:pic>
+        </mc:Fallback>
+      </mc:AlternateContent>
+      <mc:AlternateContent xmlns:mc="http://schemas.openxmlformats.org/markup-compatibility/2006">
+        <mc:Choice xmlns:p14="http://schemas.microsoft.com/office/powerpoint/2010/main" Requires="p14">
+          <p:contentPart p14:bwMode="auto" r:id="rId16">
+            <p14:nvContentPartPr>
+              <p14:cNvPr id="12" name="Ink 11">
+                <a:extLst>
+                  <a:ext uri="{FF2B5EF4-FFF2-40B4-BE49-F238E27FC236}">
+                    <a16:creationId xmlns:a16="http://schemas.microsoft.com/office/drawing/2014/main" id="{1202A8FC-FF88-430B-AC32-BC4C86317761}"/>
+                  </a:ext>
+                </a:extLst>
+              </p14:cNvPr>
+              <p14:cNvContentPartPr/>
+              <p14:nvPr/>
+            </p14:nvContentPartPr>
+            <p14:xfrm>
+              <a:off x="4887649" y="2568139"/>
+              <a:ext cx="237600" cy="688320"/>
+            </p14:xfrm>
+          </p:contentPart>
+        </mc:Choice>
+        <mc:Fallback>
+          <p:pic>
+            <p:nvPicPr>
+              <p:cNvPr id="12" name="Ink 11">
+                <a:extLst>
+                  <a:ext uri="{FF2B5EF4-FFF2-40B4-BE49-F238E27FC236}">
+                    <a16:creationId xmlns:a16="http://schemas.microsoft.com/office/drawing/2014/main" id="{1202A8FC-FF88-430B-AC32-BC4C86317761}"/>
+                  </a:ext>
+                </a:extLst>
+              </p:cNvPr>
+              <p:cNvPicPr/>
+              <p:nvPr/>
+            </p:nvPicPr>
+            <p:blipFill>
+              <a:blip r:embed="rId17"/>
+              <a:stretch>
+                <a:fillRect/>
+              </a:stretch>
+            </p:blipFill>
+            <p:spPr>
+              <a:xfrm>
+                <a:off x="4879009" y="2559499"/>
+                <a:ext cx="255240" cy="705960"/>
+              </a:xfrm>
+              <a:prstGeom prst="rect">
+                <a:avLst/>
+              </a:prstGeom>
+            </p:spPr>
+          </p:pic>
+        </mc:Fallback>
+      </mc:AlternateContent>
+      <mc:AlternateContent xmlns:mc="http://schemas.openxmlformats.org/markup-compatibility/2006">
+        <mc:Choice xmlns:p14="http://schemas.microsoft.com/office/powerpoint/2010/main" Requires="p14">
+          <p:contentPart p14:bwMode="auto" r:id="rId18">
+            <p14:nvContentPartPr>
+              <p14:cNvPr id="13" name="Ink 12">
+                <a:extLst>
+                  <a:ext uri="{FF2B5EF4-FFF2-40B4-BE49-F238E27FC236}">
+                    <a16:creationId xmlns:a16="http://schemas.microsoft.com/office/drawing/2014/main" id="{B63CDAEC-8004-4F2E-B45D-11E310588B06}"/>
+                  </a:ext>
+                </a:extLst>
+              </p14:cNvPr>
+              <p14:cNvContentPartPr/>
+              <p14:nvPr/>
+            </p14:nvContentPartPr>
+            <p14:xfrm>
+              <a:off x="1203409" y="3482899"/>
+              <a:ext cx="1346040" cy="74520"/>
+            </p14:xfrm>
+          </p:contentPart>
+        </mc:Choice>
+        <mc:Fallback>
+          <p:pic>
+            <p:nvPicPr>
+              <p:cNvPr id="13" name="Ink 12">
+                <a:extLst>
+                  <a:ext uri="{FF2B5EF4-FFF2-40B4-BE49-F238E27FC236}">
+                    <a16:creationId xmlns:a16="http://schemas.microsoft.com/office/drawing/2014/main" id="{B63CDAEC-8004-4F2E-B45D-11E310588B06}"/>
+                  </a:ext>
+                </a:extLst>
+              </p:cNvPr>
+              <p:cNvPicPr/>
+              <p:nvPr/>
+            </p:nvPicPr>
+            <p:blipFill>
+              <a:blip r:embed="rId19"/>
+              <a:stretch>
+                <a:fillRect/>
+              </a:stretch>
+            </p:blipFill>
+            <p:spPr>
+              <a:xfrm>
+                <a:off x="1194769" y="3473899"/>
+                <a:ext cx="1363680" cy="92160"/>
+              </a:xfrm>
+              <a:prstGeom prst="rect">
+                <a:avLst/>
+              </a:prstGeom>
+            </p:spPr>
+          </p:pic>
+        </mc:Fallback>
+      </mc:AlternateContent>
+      <p:grpSp>
+        <p:nvGrpSpPr>
+          <p:cNvPr id="26" name="Group 25">
+            <a:extLst>
+              <a:ext uri="{FF2B5EF4-FFF2-40B4-BE49-F238E27FC236}">
+                <a16:creationId xmlns:a16="http://schemas.microsoft.com/office/drawing/2014/main" id="{9F5ABB65-9EA6-4E0E-AFF8-A2517F50BA11}"/>
+              </a:ext>
+            </a:extLst>
+          </p:cNvPr>
+          <p:cNvGrpSpPr/>
+          <p:nvPr/>
+        </p:nvGrpSpPr>
+        <p:grpSpPr>
+          <a:xfrm>
+            <a:off x="1261009" y="3658219"/>
+            <a:ext cx="1699560" cy="514080"/>
+            <a:chOff x="1261009" y="3658219"/>
+            <a:chExt cx="1699560" cy="514080"/>
+          </a:xfrm>
+        </p:grpSpPr>
+        <mc:AlternateContent xmlns:mc="http://schemas.openxmlformats.org/markup-compatibility/2006">
+          <mc:Choice xmlns:p14="http://schemas.microsoft.com/office/powerpoint/2010/main" Requires="p14">
+            <p:contentPart p14:bwMode="auto" r:id="rId20">
+              <p14:nvContentPartPr>
+                <p14:cNvPr id="14" name="Ink 13">
+                  <a:extLst>
+                    <a:ext uri="{FF2B5EF4-FFF2-40B4-BE49-F238E27FC236}">
+                      <a16:creationId xmlns:a16="http://schemas.microsoft.com/office/drawing/2014/main" id="{6389568C-C245-4279-9B39-6142B2528549}"/>
+                    </a:ext>
+                  </a:extLst>
+                </p14:cNvPr>
+                <p14:cNvContentPartPr/>
+                <p14:nvPr/>
+              </p14:nvContentPartPr>
+              <p14:xfrm>
+                <a:off x="1261009" y="3658219"/>
+                <a:ext cx="145800" cy="479520"/>
+              </p14:xfrm>
+            </p:contentPart>
+          </mc:Choice>
+          <mc:Fallback>
+            <p:pic>
+              <p:nvPicPr>
+                <p:cNvPr id="14" name="Ink 13">
+                  <a:extLst>
+                    <a:ext uri="{FF2B5EF4-FFF2-40B4-BE49-F238E27FC236}">
+                      <a16:creationId xmlns:a16="http://schemas.microsoft.com/office/drawing/2014/main" id="{6389568C-C245-4279-9B39-6142B2528549}"/>
+                    </a:ext>
+                  </a:extLst>
+                </p:cNvPr>
+                <p:cNvPicPr/>
+                <p:nvPr/>
+              </p:nvPicPr>
+              <p:blipFill>
+                <a:blip r:embed="rId21"/>
+                <a:stretch>
+                  <a:fillRect/>
+                </a:stretch>
+              </p:blipFill>
+              <p:spPr>
+                <a:xfrm>
+                  <a:off x="1252009" y="3649219"/>
+                  <a:ext cx="163440" cy="497160"/>
+                </a:xfrm>
+                <a:prstGeom prst="rect">
+                  <a:avLst/>
+                </a:prstGeom>
+              </p:spPr>
+            </p:pic>
+          </mc:Fallback>
+        </mc:AlternateContent>
+        <mc:AlternateContent xmlns:mc="http://schemas.openxmlformats.org/markup-compatibility/2006">
+          <mc:Choice xmlns:p14="http://schemas.microsoft.com/office/powerpoint/2010/main" Requires="p14">
+            <p:contentPart p14:bwMode="auto" r:id="rId22">
+              <p14:nvContentPartPr>
+                <p14:cNvPr id="15" name="Ink 14">
+                  <a:extLst>
+                    <a:ext uri="{FF2B5EF4-FFF2-40B4-BE49-F238E27FC236}">
+                      <a16:creationId xmlns:a16="http://schemas.microsoft.com/office/drawing/2014/main" id="{769CDFFF-D24E-4960-852D-4F2634EC5933}"/>
+                    </a:ext>
+                  </a:extLst>
+                </p14:cNvPr>
+                <p14:cNvContentPartPr/>
+                <p14:nvPr/>
+              </p14:nvContentPartPr>
+              <p14:xfrm>
+                <a:off x="1527769" y="3963499"/>
+                <a:ext cx="79560" cy="208800"/>
+              </p14:xfrm>
+            </p:contentPart>
+          </mc:Choice>
+          <mc:Fallback>
+            <p:pic>
+              <p:nvPicPr>
+                <p:cNvPr id="15" name="Ink 14">
+                  <a:extLst>
+                    <a:ext uri="{FF2B5EF4-FFF2-40B4-BE49-F238E27FC236}">
+                      <a16:creationId xmlns:a16="http://schemas.microsoft.com/office/drawing/2014/main" id="{769CDFFF-D24E-4960-852D-4F2634EC5933}"/>
+                    </a:ext>
+                  </a:extLst>
+                </p:cNvPr>
+                <p:cNvPicPr/>
+                <p:nvPr/>
+              </p:nvPicPr>
+              <p:blipFill>
+                <a:blip r:embed="rId23"/>
+                <a:stretch>
+                  <a:fillRect/>
+                </a:stretch>
+              </p:blipFill>
+              <p:spPr>
+                <a:xfrm>
+                  <a:off x="1519129" y="3954859"/>
+                  <a:ext cx="97200" cy="226440"/>
+                </a:xfrm>
+                <a:prstGeom prst="rect">
+                  <a:avLst/>
+                </a:prstGeom>
+              </p:spPr>
+            </p:pic>
+          </mc:Fallback>
+        </mc:AlternateContent>
+        <mc:AlternateContent xmlns:mc="http://schemas.openxmlformats.org/markup-compatibility/2006">
+          <mc:Choice xmlns:p14="http://schemas.microsoft.com/office/powerpoint/2010/main" Requires="p14">
+            <p:contentPart p14:bwMode="auto" r:id="rId24">
+              <p14:nvContentPartPr>
+                <p14:cNvPr id="17" name="Ink 16">
+                  <a:extLst>
+                    <a:ext uri="{FF2B5EF4-FFF2-40B4-BE49-F238E27FC236}">
+                      <a16:creationId xmlns:a16="http://schemas.microsoft.com/office/drawing/2014/main" id="{5E1E3D6C-21D6-42E6-905E-1964421D5DB7}"/>
+                    </a:ext>
+                  </a:extLst>
+                </p14:cNvPr>
+                <p14:cNvContentPartPr/>
+                <p14:nvPr/>
+              </p14:nvContentPartPr>
+              <p14:xfrm>
+                <a:off x="1557649" y="4061059"/>
+                <a:ext cx="135000" cy="47160"/>
+              </p14:xfrm>
+            </p:contentPart>
+          </mc:Choice>
+          <mc:Fallback>
+            <p:pic>
+              <p:nvPicPr>
+                <p:cNvPr id="17" name="Ink 16">
+                  <a:extLst>
+                    <a:ext uri="{FF2B5EF4-FFF2-40B4-BE49-F238E27FC236}">
+                      <a16:creationId xmlns:a16="http://schemas.microsoft.com/office/drawing/2014/main" id="{5E1E3D6C-21D6-42E6-905E-1964421D5DB7}"/>
+                    </a:ext>
+                  </a:extLst>
+                </p:cNvPr>
+                <p:cNvPicPr/>
+                <p:nvPr/>
+              </p:nvPicPr>
+              <p:blipFill>
+                <a:blip r:embed="rId25"/>
+                <a:stretch>
+                  <a:fillRect/>
+                </a:stretch>
+              </p:blipFill>
+              <p:spPr>
+                <a:xfrm>
+                  <a:off x="1548649" y="4052059"/>
+                  <a:ext cx="152640" cy="64800"/>
+                </a:xfrm>
+                <a:prstGeom prst="rect">
+                  <a:avLst/>
+                </a:prstGeom>
+              </p:spPr>
+            </p:pic>
+          </mc:Fallback>
+        </mc:AlternateContent>
+        <mc:AlternateContent xmlns:mc="http://schemas.openxmlformats.org/markup-compatibility/2006">
+          <mc:Choice xmlns:p14="http://schemas.microsoft.com/office/powerpoint/2010/main" Requires="p14">
+            <p:contentPart p14:bwMode="auto" r:id="rId26">
+              <p14:nvContentPartPr>
+                <p14:cNvPr id="18" name="Ink 17">
+                  <a:extLst>
+                    <a:ext uri="{FF2B5EF4-FFF2-40B4-BE49-F238E27FC236}">
+                      <a16:creationId xmlns:a16="http://schemas.microsoft.com/office/drawing/2014/main" id="{EB735AF3-B910-4873-966F-954F85A4AA4A}"/>
+                    </a:ext>
+                  </a:extLst>
+                </p14:cNvPr>
+                <p14:cNvContentPartPr/>
+                <p14:nvPr/>
+              </p14:nvContentPartPr>
+              <p14:xfrm>
+                <a:off x="1756369" y="3962059"/>
+                <a:ext cx="128520" cy="200520"/>
+              </p14:xfrm>
+            </p:contentPart>
+          </mc:Choice>
+          <mc:Fallback>
+            <p:pic>
+              <p:nvPicPr>
+                <p:cNvPr id="18" name="Ink 17">
+                  <a:extLst>
+                    <a:ext uri="{FF2B5EF4-FFF2-40B4-BE49-F238E27FC236}">
+                      <a16:creationId xmlns:a16="http://schemas.microsoft.com/office/drawing/2014/main" id="{EB735AF3-B910-4873-966F-954F85A4AA4A}"/>
+                    </a:ext>
+                  </a:extLst>
+                </p:cNvPr>
+                <p:cNvPicPr/>
+                <p:nvPr/>
+              </p:nvPicPr>
+              <p:blipFill>
+                <a:blip r:embed="rId27"/>
+                <a:stretch>
+                  <a:fillRect/>
+                </a:stretch>
+              </p:blipFill>
+              <p:spPr>
+                <a:xfrm>
+                  <a:off x="1747729" y="3953419"/>
+                  <a:ext cx="146160" cy="218160"/>
+                </a:xfrm>
+                <a:prstGeom prst="rect">
+                  <a:avLst/>
+                </a:prstGeom>
+              </p:spPr>
+            </p:pic>
+          </mc:Fallback>
+        </mc:AlternateContent>
+        <mc:AlternateContent xmlns:mc="http://schemas.openxmlformats.org/markup-compatibility/2006">
+          <mc:Choice xmlns:p14="http://schemas.microsoft.com/office/powerpoint/2010/main" Requires="p14">
+            <p:contentPart p14:bwMode="auto" r:id="rId28">
+              <p14:nvContentPartPr>
+                <p14:cNvPr id="19" name="Ink 18">
+                  <a:extLst>
+                    <a:ext uri="{FF2B5EF4-FFF2-40B4-BE49-F238E27FC236}">
+                      <a16:creationId xmlns:a16="http://schemas.microsoft.com/office/drawing/2014/main" id="{5772921E-23E2-4049-BA09-F370F0E58E49}"/>
+                    </a:ext>
+                  </a:extLst>
+                </p14:cNvPr>
+                <p14:cNvContentPartPr/>
+                <p14:nvPr/>
+              </p14:nvContentPartPr>
+              <p14:xfrm>
+                <a:off x="1937089" y="3993739"/>
+                <a:ext cx="46080" cy="91080"/>
+              </p14:xfrm>
+            </p:contentPart>
+          </mc:Choice>
+          <mc:Fallback>
+            <p:pic>
+              <p:nvPicPr>
+                <p:cNvPr id="19" name="Ink 18">
+                  <a:extLst>
+                    <a:ext uri="{FF2B5EF4-FFF2-40B4-BE49-F238E27FC236}">
+                      <a16:creationId xmlns:a16="http://schemas.microsoft.com/office/drawing/2014/main" id="{5772921E-23E2-4049-BA09-F370F0E58E49}"/>
+                    </a:ext>
+                  </a:extLst>
+                </p:cNvPr>
+                <p:cNvPicPr/>
+                <p:nvPr/>
+              </p:nvPicPr>
+              <p:blipFill>
+                <a:blip r:embed="rId29"/>
+                <a:stretch>
+                  <a:fillRect/>
+                </a:stretch>
+              </p:blipFill>
+              <p:spPr>
+                <a:xfrm>
+                  <a:off x="1928089" y="3985099"/>
+                  <a:ext cx="63720" cy="108720"/>
+                </a:xfrm>
+                <a:prstGeom prst="rect">
+                  <a:avLst/>
+                </a:prstGeom>
+              </p:spPr>
+            </p:pic>
+          </mc:Fallback>
+        </mc:AlternateContent>
+        <mc:AlternateContent xmlns:mc="http://schemas.openxmlformats.org/markup-compatibility/2006">
+          <mc:Choice xmlns:p14="http://schemas.microsoft.com/office/powerpoint/2010/main" Requires="p14">
+            <p:contentPart p14:bwMode="auto" r:id="rId30">
+              <p14:nvContentPartPr>
+                <p14:cNvPr id="20" name="Ink 19">
+                  <a:extLst>
+                    <a:ext uri="{FF2B5EF4-FFF2-40B4-BE49-F238E27FC236}">
+                      <a16:creationId xmlns:a16="http://schemas.microsoft.com/office/drawing/2014/main" id="{23B88E8E-4B3E-4019-AAAA-F46C7585B826}"/>
+                    </a:ext>
+                  </a:extLst>
+                </p14:cNvPr>
+                <p14:cNvContentPartPr/>
+                <p14:nvPr/>
+              </p14:nvContentPartPr>
+              <p14:xfrm>
+                <a:off x="2071369" y="4056739"/>
+                <a:ext cx="178560" cy="77040"/>
+              </p14:xfrm>
+            </p:contentPart>
+          </mc:Choice>
+          <mc:Fallback>
+            <p:pic>
+              <p:nvPicPr>
+                <p:cNvPr id="20" name="Ink 19">
+                  <a:extLst>
+                    <a:ext uri="{FF2B5EF4-FFF2-40B4-BE49-F238E27FC236}">
+                      <a16:creationId xmlns:a16="http://schemas.microsoft.com/office/drawing/2014/main" id="{23B88E8E-4B3E-4019-AAAA-F46C7585B826}"/>
+                    </a:ext>
+                  </a:extLst>
+                </p:cNvPr>
+                <p:cNvPicPr/>
+                <p:nvPr/>
+              </p:nvPicPr>
+              <p:blipFill>
+                <a:blip r:embed="rId31"/>
+                <a:stretch>
+                  <a:fillRect/>
+                </a:stretch>
+              </p:blipFill>
+              <p:spPr>
+                <a:xfrm>
+                  <a:off x="2062369" y="4048099"/>
+                  <a:ext cx="196200" cy="94680"/>
+                </a:xfrm>
+                <a:prstGeom prst="rect">
+                  <a:avLst/>
+                </a:prstGeom>
+              </p:spPr>
+            </p:pic>
+          </mc:Fallback>
+        </mc:AlternateContent>
+        <mc:AlternateContent xmlns:mc="http://schemas.openxmlformats.org/markup-compatibility/2006">
+          <mc:Choice xmlns:p14="http://schemas.microsoft.com/office/powerpoint/2010/main" Requires="p14">
+            <p:contentPart p14:bwMode="auto" r:id="rId32">
+              <p14:nvContentPartPr>
+                <p14:cNvPr id="21" name="Ink 20">
+                  <a:extLst>
+                    <a:ext uri="{FF2B5EF4-FFF2-40B4-BE49-F238E27FC236}">
+                      <a16:creationId xmlns:a16="http://schemas.microsoft.com/office/drawing/2014/main" id="{7F0E4FE1-9E11-4238-A0CB-B8634595F42C}"/>
+                    </a:ext>
+                  </a:extLst>
+                </p14:cNvPr>
+                <p14:cNvContentPartPr/>
+                <p14:nvPr/>
+              </p14:nvContentPartPr>
+              <p14:xfrm>
+                <a:off x="2273329" y="3971059"/>
+                <a:ext cx="86400" cy="170640"/>
+              </p14:xfrm>
+            </p:contentPart>
+          </mc:Choice>
+          <mc:Fallback>
+            <p:pic>
+              <p:nvPicPr>
+                <p:cNvPr id="21" name="Ink 20">
+                  <a:extLst>
+                    <a:ext uri="{FF2B5EF4-FFF2-40B4-BE49-F238E27FC236}">
+                      <a16:creationId xmlns:a16="http://schemas.microsoft.com/office/drawing/2014/main" id="{7F0E4FE1-9E11-4238-A0CB-B8634595F42C}"/>
+                    </a:ext>
+                  </a:extLst>
+                </p:cNvPr>
+                <p:cNvPicPr/>
+                <p:nvPr/>
+              </p:nvPicPr>
+              <p:blipFill>
+                <a:blip r:embed="rId33"/>
+                <a:stretch>
+                  <a:fillRect/>
+                </a:stretch>
+              </p:blipFill>
+              <p:spPr>
+                <a:xfrm>
+                  <a:off x="2264689" y="3962419"/>
+                  <a:ext cx="104040" cy="188280"/>
+                </a:xfrm>
+                <a:prstGeom prst="rect">
+                  <a:avLst/>
+                </a:prstGeom>
+              </p:spPr>
+            </p:pic>
+          </mc:Fallback>
+        </mc:AlternateContent>
+        <mc:AlternateContent xmlns:mc="http://schemas.openxmlformats.org/markup-compatibility/2006">
+          <mc:Choice xmlns:p14="http://schemas.microsoft.com/office/powerpoint/2010/main" Requires="p14">
+            <p:contentPart p14:bwMode="auto" r:id="rId34">
+              <p14:nvContentPartPr>
+                <p14:cNvPr id="22" name="Ink 21">
+                  <a:extLst>
+                    <a:ext uri="{FF2B5EF4-FFF2-40B4-BE49-F238E27FC236}">
+                      <a16:creationId xmlns:a16="http://schemas.microsoft.com/office/drawing/2014/main" id="{47F2911F-A808-41BA-9954-46E772753928}"/>
+                    </a:ext>
+                  </a:extLst>
+                </p14:cNvPr>
+                <p14:cNvContentPartPr/>
+                <p14:nvPr/>
+              </p14:nvContentPartPr>
+              <p14:xfrm>
+                <a:off x="2362249" y="4035859"/>
+                <a:ext cx="115920" cy="104040"/>
+              </p14:xfrm>
+            </p:contentPart>
+          </mc:Choice>
+          <mc:Fallback>
+            <p:pic>
+              <p:nvPicPr>
+                <p:cNvPr id="22" name="Ink 21">
+                  <a:extLst>
+                    <a:ext uri="{FF2B5EF4-FFF2-40B4-BE49-F238E27FC236}">
+                      <a16:creationId xmlns:a16="http://schemas.microsoft.com/office/drawing/2014/main" id="{47F2911F-A808-41BA-9954-46E772753928}"/>
+                    </a:ext>
+                  </a:extLst>
+                </p:cNvPr>
+                <p:cNvPicPr/>
+                <p:nvPr/>
+              </p:nvPicPr>
+              <p:blipFill>
+                <a:blip r:embed="rId35"/>
+                <a:stretch>
+                  <a:fillRect/>
+                </a:stretch>
+              </p:blipFill>
+              <p:spPr>
+                <a:xfrm>
+                  <a:off x="2353609" y="4026859"/>
+                  <a:ext cx="133560" cy="121680"/>
+                </a:xfrm>
+                <a:prstGeom prst="rect">
+                  <a:avLst/>
+                </a:prstGeom>
+              </p:spPr>
+            </p:pic>
+          </mc:Fallback>
+        </mc:AlternateContent>
+        <mc:AlternateContent xmlns:mc="http://schemas.openxmlformats.org/markup-compatibility/2006">
+          <mc:Choice xmlns:p14="http://schemas.microsoft.com/office/powerpoint/2010/main" Requires="p14">
+            <p:contentPart p14:bwMode="auto" r:id="rId36">
+              <p14:nvContentPartPr>
+                <p14:cNvPr id="23" name="Ink 22">
+                  <a:extLst>
+                    <a:ext uri="{FF2B5EF4-FFF2-40B4-BE49-F238E27FC236}">
+                      <a16:creationId xmlns:a16="http://schemas.microsoft.com/office/drawing/2014/main" id="{D6A31E8E-9012-405B-A3AC-22542E42ED98}"/>
+                    </a:ext>
+                  </a:extLst>
+                </p14:cNvPr>
+                <p14:cNvContentPartPr/>
+                <p14:nvPr/>
+              </p14:nvContentPartPr>
+              <p14:xfrm>
+                <a:off x="2510209" y="4052779"/>
+                <a:ext cx="100800" cy="69840"/>
+              </p14:xfrm>
+            </p:contentPart>
+          </mc:Choice>
+          <mc:Fallback>
+            <p:pic>
+              <p:nvPicPr>
+                <p:cNvPr id="23" name="Ink 22">
+                  <a:extLst>
+                    <a:ext uri="{FF2B5EF4-FFF2-40B4-BE49-F238E27FC236}">
+                      <a16:creationId xmlns:a16="http://schemas.microsoft.com/office/drawing/2014/main" id="{D6A31E8E-9012-405B-A3AC-22542E42ED98}"/>
+                    </a:ext>
+                  </a:extLst>
+                </p:cNvPr>
+                <p:cNvPicPr/>
+                <p:nvPr/>
+              </p:nvPicPr>
+              <p:blipFill>
+                <a:blip r:embed="rId37"/>
+                <a:stretch>
+                  <a:fillRect/>
+                </a:stretch>
+              </p:blipFill>
+              <p:spPr>
+                <a:xfrm>
+                  <a:off x="2501569" y="4043779"/>
+                  <a:ext cx="118440" cy="87480"/>
+                </a:xfrm>
+                <a:prstGeom prst="rect">
+                  <a:avLst/>
+                </a:prstGeom>
+              </p:spPr>
+            </p:pic>
+          </mc:Fallback>
+        </mc:AlternateContent>
+        <mc:AlternateContent xmlns:mc="http://schemas.openxmlformats.org/markup-compatibility/2006">
+          <mc:Choice xmlns:p14="http://schemas.microsoft.com/office/powerpoint/2010/main" Requires="p14">
+            <p:contentPart p14:bwMode="auto" r:id="rId38">
+              <p14:nvContentPartPr>
+                <p14:cNvPr id="24" name="Ink 23">
+                  <a:extLst>
+                    <a:ext uri="{FF2B5EF4-FFF2-40B4-BE49-F238E27FC236}">
+                      <a16:creationId xmlns:a16="http://schemas.microsoft.com/office/drawing/2014/main" id="{B5CE8A56-FEE1-489E-BC29-5F16035D42C1}"/>
+                    </a:ext>
+                  </a:extLst>
+                </p14:cNvPr>
+                <p14:cNvContentPartPr/>
+                <p14:nvPr/>
+              </p14:nvContentPartPr>
+              <p14:xfrm>
+                <a:off x="2676889" y="3938299"/>
+                <a:ext cx="104400" cy="193320"/>
+              </p14:xfrm>
+            </p:contentPart>
+          </mc:Choice>
+          <mc:Fallback>
+            <p:pic>
+              <p:nvPicPr>
+                <p:cNvPr id="24" name="Ink 23">
+                  <a:extLst>
+                    <a:ext uri="{FF2B5EF4-FFF2-40B4-BE49-F238E27FC236}">
+                      <a16:creationId xmlns:a16="http://schemas.microsoft.com/office/drawing/2014/main" id="{B5CE8A56-FEE1-489E-BC29-5F16035D42C1}"/>
+                    </a:ext>
+                  </a:extLst>
+                </p:cNvPr>
+                <p:cNvPicPr/>
+                <p:nvPr/>
+              </p:nvPicPr>
+              <p:blipFill>
+                <a:blip r:embed="rId39"/>
+                <a:stretch>
+                  <a:fillRect/>
+                </a:stretch>
+              </p:blipFill>
+              <p:spPr>
+                <a:xfrm>
+                  <a:off x="2667889" y="3929659"/>
+                  <a:ext cx="122040" cy="210960"/>
+                </a:xfrm>
+                <a:prstGeom prst="rect">
+                  <a:avLst/>
+                </a:prstGeom>
+              </p:spPr>
+            </p:pic>
+          </mc:Fallback>
+        </mc:AlternateContent>
+        <mc:AlternateContent xmlns:mc="http://schemas.openxmlformats.org/markup-compatibility/2006">
+          <mc:Choice xmlns:p14="http://schemas.microsoft.com/office/powerpoint/2010/main" Requires="p14">
+            <p:contentPart p14:bwMode="auto" r:id="rId40">
+              <p14:nvContentPartPr>
+                <p14:cNvPr id="25" name="Ink 24">
+                  <a:extLst>
+                    <a:ext uri="{FF2B5EF4-FFF2-40B4-BE49-F238E27FC236}">
+                      <a16:creationId xmlns:a16="http://schemas.microsoft.com/office/drawing/2014/main" id="{4D445EAD-72D1-4E90-85BE-3EA223A95B32}"/>
+                    </a:ext>
+                  </a:extLst>
+                </p14:cNvPr>
+                <p14:cNvContentPartPr/>
+                <p14:nvPr/>
+              </p14:nvContentPartPr>
+              <p14:xfrm>
+                <a:off x="2792089" y="4038019"/>
+                <a:ext cx="168480" cy="97200"/>
+              </p14:xfrm>
+            </p:contentPart>
+          </mc:Choice>
+          <mc:Fallback>
+            <p:pic>
+              <p:nvPicPr>
+                <p:cNvPr id="25" name="Ink 24">
+                  <a:extLst>
+                    <a:ext uri="{FF2B5EF4-FFF2-40B4-BE49-F238E27FC236}">
+                      <a16:creationId xmlns:a16="http://schemas.microsoft.com/office/drawing/2014/main" id="{4D445EAD-72D1-4E90-85BE-3EA223A95B32}"/>
+                    </a:ext>
+                  </a:extLst>
+                </p:cNvPr>
+                <p:cNvPicPr/>
+                <p:nvPr/>
+              </p:nvPicPr>
+              <p:blipFill>
+                <a:blip r:embed="rId41"/>
+                <a:stretch>
+                  <a:fillRect/>
+                </a:stretch>
+              </p:blipFill>
+              <p:spPr>
+                <a:xfrm>
+                  <a:off x="2783449" y="4029019"/>
+                  <a:ext cx="186120" cy="114840"/>
+                </a:xfrm>
+                <a:prstGeom prst="rect">
+                  <a:avLst/>
+                </a:prstGeom>
+              </p:spPr>
+            </p:pic>
+          </mc:Fallback>
+        </mc:AlternateContent>
+      </p:grpSp>
+      <mc:AlternateContent xmlns:mc="http://schemas.openxmlformats.org/markup-compatibility/2006">
+        <mc:Choice xmlns:p14="http://schemas.microsoft.com/office/powerpoint/2010/main" Requires="p14">
+          <p:contentPart p14:bwMode="auto" r:id="rId42">
+            <p14:nvContentPartPr>
+              <p14:cNvPr id="27" name="Ink 26">
+                <a:extLst>
+                  <a:ext uri="{FF2B5EF4-FFF2-40B4-BE49-F238E27FC236}">
+                    <a16:creationId xmlns:a16="http://schemas.microsoft.com/office/drawing/2014/main" id="{4AE39697-9B6E-4A29-A3C0-7C9577413F1A}"/>
+                  </a:ext>
+                </a:extLst>
+              </p14:cNvPr>
+              <p14:cNvContentPartPr/>
+              <p14:nvPr/>
+            </p14:nvContentPartPr>
+            <p14:xfrm>
+              <a:off x="3081169" y="3879979"/>
+              <a:ext cx="995040" cy="69840"/>
+            </p14:xfrm>
+          </p:contentPart>
+        </mc:Choice>
+        <mc:Fallback>
+          <p:pic>
+            <p:nvPicPr>
+              <p:cNvPr id="27" name="Ink 26">
+                <a:extLst>
+                  <a:ext uri="{FF2B5EF4-FFF2-40B4-BE49-F238E27FC236}">
+                    <a16:creationId xmlns:a16="http://schemas.microsoft.com/office/drawing/2014/main" id="{4AE39697-9B6E-4A29-A3C0-7C9577413F1A}"/>
+                  </a:ext>
+                </a:extLst>
+              </p:cNvPr>
+              <p:cNvPicPr/>
+              <p:nvPr/>
+            </p:nvPicPr>
+            <p:blipFill>
+              <a:blip r:embed="rId43"/>
+              <a:stretch>
+                <a:fillRect/>
+              </a:stretch>
+            </p:blipFill>
+            <p:spPr>
+              <a:xfrm>
+                <a:off x="3072169" y="3871339"/>
+                <a:ext cx="1012680" cy="87480"/>
+              </a:xfrm>
+              <a:prstGeom prst="rect">
+                <a:avLst/>
+              </a:prstGeom>
+            </p:spPr>
+          </p:pic>
+        </mc:Fallback>
+      </mc:AlternateContent>
     </p:spTree>
     <p:extLst>
       <p:ext uri="{BB962C8B-B14F-4D97-AF65-F5344CB8AC3E}">

</xml_diff>